<commit_message>
<feat> add multi BC, python parser
</commit_message>
<xml_diff>
--- a/Final Project - Conjugate Gradient method.pptx
+++ b/Final Project - Conjugate Gradient method.pptx
@@ -14,6 +14,8 @@
     <p:sldId id="262" r:id="rId8"/>
     <p:sldId id="263" r:id="rId9"/>
     <p:sldId id="264" r:id="rId10"/>
+    <p:sldId id="265" r:id="rId11"/>
+    <p:sldId id="267" r:id="rId12"/>
   </p:sldIdLst>
   <p:sldSz cx="12192000" cy="6858000"/>
   <p:notesSz cx="6858000" cy="9144000"/>
@@ -162,10 +164,9 @@
           </a:lstStyle>
           <a:p>
             <a:r>
-              <a:rPr lang="zh-TW" altLang="en-US" smtClean="0"/>
+              <a:rPr lang="zh-TW" altLang="en-US"/>
               <a:t>按一下以編輯母片標題樣式</a:t>
             </a:r>
-            <a:endParaRPr lang="zh-TW" altLang="en-US"/>
           </a:p>
         </p:txBody>
       </p:sp>
@@ -227,10 +228,9 @@
           </a:lstStyle>
           <a:p>
             <a:r>
-              <a:rPr lang="zh-TW" altLang="en-US" smtClean="0"/>
+              <a:rPr lang="zh-TW" altLang="en-US"/>
               <a:t>按一下以編輯母片副標題樣式</a:t>
             </a:r>
-            <a:endParaRPr lang="zh-TW" altLang="en-US"/>
           </a:p>
         </p:txBody>
       </p:sp>
@@ -251,7 +251,7 @@
           <a:p>
             <a:fld id="{E52FBAA3-F589-4A89-8837-2ACCD95660B2}" type="datetimeFigureOut">
               <a:rPr lang="zh-TW" altLang="en-US" smtClean="0"/>
-              <a:t>2021/5/31</a:t>
+              <a:t>2021/6/15</a:t>
             </a:fld>
             <a:endParaRPr lang="zh-TW" altLang="en-US"/>
           </a:p>
@@ -345,10 +345,9 @@
           <a:lstStyle/>
           <a:p>
             <a:r>
-              <a:rPr lang="zh-TW" altLang="en-US" smtClean="0"/>
+              <a:rPr lang="zh-TW" altLang="en-US"/>
               <a:t>按一下以編輯母片標題樣式</a:t>
             </a:r>
-            <a:endParaRPr lang="zh-TW" altLang="en-US"/>
           </a:p>
         </p:txBody>
       </p:sp>
@@ -369,38 +368,37 @@
           <a:p>
             <a:pPr lvl="0"/>
             <a:r>
-              <a:rPr lang="zh-TW" altLang="en-US" smtClean="0"/>
+              <a:rPr lang="zh-TW" altLang="en-US"/>
               <a:t>編輯母片文字樣式</a:t>
             </a:r>
           </a:p>
           <a:p>
             <a:pPr lvl="1"/>
             <a:r>
-              <a:rPr lang="zh-TW" altLang="en-US" smtClean="0"/>
+              <a:rPr lang="zh-TW" altLang="en-US"/>
               <a:t>第二層</a:t>
             </a:r>
           </a:p>
           <a:p>
             <a:pPr lvl="2"/>
             <a:r>
-              <a:rPr lang="zh-TW" altLang="en-US" smtClean="0"/>
+              <a:rPr lang="zh-TW" altLang="en-US"/>
               <a:t>第三層</a:t>
             </a:r>
           </a:p>
           <a:p>
             <a:pPr lvl="3"/>
             <a:r>
-              <a:rPr lang="zh-TW" altLang="en-US" smtClean="0"/>
+              <a:rPr lang="zh-TW" altLang="en-US"/>
               <a:t>第四層</a:t>
             </a:r>
           </a:p>
           <a:p>
             <a:pPr lvl="4"/>
             <a:r>
-              <a:rPr lang="zh-TW" altLang="en-US" smtClean="0"/>
+              <a:rPr lang="zh-TW" altLang="en-US"/>
               <a:t>第五層</a:t>
             </a:r>
-            <a:endParaRPr lang="zh-TW" altLang="en-US"/>
           </a:p>
         </p:txBody>
       </p:sp>
@@ -421,7 +419,7 @@
           <a:p>
             <a:fld id="{E52FBAA3-F589-4A89-8837-2ACCD95660B2}" type="datetimeFigureOut">
               <a:rPr lang="zh-TW" altLang="en-US" smtClean="0"/>
-              <a:t>2021/5/31</a:t>
+              <a:t>2021/6/15</a:t>
             </a:fld>
             <a:endParaRPr lang="zh-TW" altLang="en-US"/>
           </a:p>
@@ -520,10 +518,9 @@
           <a:lstStyle/>
           <a:p>
             <a:r>
-              <a:rPr lang="zh-TW" altLang="en-US" smtClean="0"/>
+              <a:rPr lang="zh-TW" altLang="en-US"/>
               <a:t>按一下以編輯母片標題樣式</a:t>
             </a:r>
-            <a:endParaRPr lang="zh-TW" altLang="en-US"/>
           </a:p>
         </p:txBody>
       </p:sp>
@@ -549,38 +546,37 @@
           <a:p>
             <a:pPr lvl="0"/>
             <a:r>
-              <a:rPr lang="zh-TW" altLang="en-US" smtClean="0"/>
+              <a:rPr lang="zh-TW" altLang="en-US"/>
               <a:t>編輯母片文字樣式</a:t>
             </a:r>
           </a:p>
           <a:p>
             <a:pPr lvl="1"/>
             <a:r>
-              <a:rPr lang="zh-TW" altLang="en-US" smtClean="0"/>
+              <a:rPr lang="zh-TW" altLang="en-US"/>
               <a:t>第二層</a:t>
             </a:r>
           </a:p>
           <a:p>
             <a:pPr lvl="2"/>
             <a:r>
-              <a:rPr lang="zh-TW" altLang="en-US" smtClean="0"/>
+              <a:rPr lang="zh-TW" altLang="en-US"/>
               <a:t>第三層</a:t>
             </a:r>
           </a:p>
           <a:p>
             <a:pPr lvl="3"/>
             <a:r>
-              <a:rPr lang="zh-TW" altLang="en-US" smtClean="0"/>
+              <a:rPr lang="zh-TW" altLang="en-US"/>
               <a:t>第四層</a:t>
             </a:r>
           </a:p>
           <a:p>
             <a:pPr lvl="4"/>
             <a:r>
-              <a:rPr lang="zh-TW" altLang="en-US" smtClean="0"/>
+              <a:rPr lang="zh-TW" altLang="en-US"/>
               <a:t>第五層</a:t>
             </a:r>
-            <a:endParaRPr lang="zh-TW" altLang="en-US"/>
           </a:p>
         </p:txBody>
       </p:sp>
@@ -601,7 +597,7 @@
           <a:p>
             <a:fld id="{E52FBAA3-F589-4A89-8837-2ACCD95660B2}" type="datetimeFigureOut">
               <a:rPr lang="zh-TW" altLang="en-US" smtClean="0"/>
-              <a:t>2021/5/31</a:t>
+              <a:t>2021/6/15</a:t>
             </a:fld>
             <a:endParaRPr lang="zh-TW" altLang="en-US"/>
           </a:p>
@@ -695,10 +691,9 @@
           <a:lstStyle/>
           <a:p>
             <a:r>
-              <a:rPr lang="zh-TW" altLang="en-US" smtClean="0"/>
+              <a:rPr lang="zh-TW" altLang="en-US"/>
               <a:t>按一下以編輯母片標題樣式</a:t>
             </a:r>
-            <a:endParaRPr lang="zh-TW" altLang="en-US"/>
           </a:p>
         </p:txBody>
       </p:sp>
@@ -719,38 +714,37 @@
           <a:p>
             <a:pPr lvl="0"/>
             <a:r>
-              <a:rPr lang="zh-TW" altLang="en-US" smtClean="0"/>
+              <a:rPr lang="zh-TW" altLang="en-US"/>
               <a:t>編輯母片文字樣式</a:t>
             </a:r>
           </a:p>
           <a:p>
             <a:pPr lvl="1"/>
             <a:r>
-              <a:rPr lang="zh-TW" altLang="en-US" smtClean="0"/>
+              <a:rPr lang="zh-TW" altLang="en-US"/>
               <a:t>第二層</a:t>
             </a:r>
           </a:p>
           <a:p>
             <a:pPr lvl="2"/>
             <a:r>
-              <a:rPr lang="zh-TW" altLang="en-US" smtClean="0"/>
+              <a:rPr lang="zh-TW" altLang="en-US"/>
               <a:t>第三層</a:t>
             </a:r>
           </a:p>
           <a:p>
             <a:pPr lvl="3"/>
             <a:r>
-              <a:rPr lang="zh-TW" altLang="en-US" smtClean="0"/>
+              <a:rPr lang="zh-TW" altLang="en-US"/>
               <a:t>第四層</a:t>
             </a:r>
           </a:p>
           <a:p>
             <a:pPr lvl="4"/>
             <a:r>
-              <a:rPr lang="zh-TW" altLang="en-US" smtClean="0"/>
+              <a:rPr lang="zh-TW" altLang="en-US"/>
               <a:t>第五層</a:t>
             </a:r>
-            <a:endParaRPr lang="zh-TW" altLang="en-US"/>
           </a:p>
         </p:txBody>
       </p:sp>
@@ -771,7 +765,7 @@
           <a:p>
             <a:fld id="{E52FBAA3-F589-4A89-8837-2ACCD95660B2}" type="datetimeFigureOut">
               <a:rPr lang="zh-TW" altLang="en-US" smtClean="0"/>
-              <a:t>2021/5/31</a:t>
+              <a:t>2021/6/15</a:t>
             </a:fld>
             <a:endParaRPr lang="zh-TW" altLang="en-US"/>
           </a:p>
@@ -874,10 +868,9 @@
           </a:lstStyle>
           <a:p>
             <a:r>
-              <a:rPr lang="zh-TW" altLang="en-US" smtClean="0"/>
+              <a:rPr lang="zh-TW" altLang="en-US"/>
               <a:t>按一下以編輯母片標題樣式</a:t>
             </a:r>
-            <a:endParaRPr lang="zh-TW" altLang="en-US"/>
           </a:p>
         </p:txBody>
       </p:sp>
@@ -994,7 +987,7 @@
           <a:p>
             <a:pPr lvl="0"/>
             <a:r>
-              <a:rPr lang="zh-TW" altLang="en-US" smtClean="0"/>
+              <a:rPr lang="zh-TW" altLang="en-US"/>
               <a:t>編輯母片文字樣式</a:t>
             </a:r>
           </a:p>
@@ -1017,7 +1010,7 @@
           <a:p>
             <a:fld id="{E52FBAA3-F589-4A89-8837-2ACCD95660B2}" type="datetimeFigureOut">
               <a:rPr lang="zh-TW" altLang="en-US" smtClean="0"/>
-              <a:t>2021/5/31</a:t>
+              <a:t>2021/6/15</a:t>
             </a:fld>
             <a:endParaRPr lang="zh-TW" altLang="en-US"/>
           </a:p>
@@ -1111,10 +1104,9 @@
           <a:lstStyle/>
           <a:p>
             <a:r>
-              <a:rPr lang="zh-TW" altLang="en-US" smtClean="0"/>
+              <a:rPr lang="zh-TW" altLang="en-US"/>
               <a:t>按一下以編輯母片標題樣式</a:t>
             </a:r>
-            <a:endParaRPr lang="zh-TW" altLang="en-US"/>
           </a:p>
         </p:txBody>
       </p:sp>
@@ -1140,38 +1132,37 @@
           <a:p>
             <a:pPr lvl="0"/>
             <a:r>
-              <a:rPr lang="zh-TW" altLang="en-US" smtClean="0"/>
+              <a:rPr lang="zh-TW" altLang="en-US"/>
               <a:t>編輯母片文字樣式</a:t>
             </a:r>
           </a:p>
           <a:p>
             <a:pPr lvl="1"/>
             <a:r>
-              <a:rPr lang="zh-TW" altLang="en-US" smtClean="0"/>
+              <a:rPr lang="zh-TW" altLang="en-US"/>
               <a:t>第二層</a:t>
             </a:r>
           </a:p>
           <a:p>
             <a:pPr lvl="2"/>
             <a:r>
-              <a:rPr lang="zh-TW" altLang="en-US" smtClean="0"/>
+              <a:rPr lang="zh-TW" altLang="en-US"/>
               <a:t>第三層</a:t>
             </a:r>
           </a:p>
           <a:p>
             <a:pPr lvl="3"/>
             <a:r>
-              <a:rPr lang="zh-TW" altLang="en-US" smtClean="0"/>
+              <a:rPr lang="zh-TW" altLang="en-US"/>
               <a:t>第四層</a:t>
             </a:r>
           </a:p>
           <a:p>
             <a:pPr lvl="4"/>
             <a:r>
-              <a:rPr lang="zh-TW" altLang="en-US" smtClean="0"/>
+              <a:rPr lang="zh-TW" altLang="en-US"/>
               <a:t>第五層</a:t>
             </a:r>
-            <a:endParaRPr lang="zh-TW" altLang="en-US"/>
           </a:p>
         </p:txBody>
       </p:sp>
@@ -1197,38 +1188,37 @@
           <a:p>
             <a:pPr lvl="0"/>
             <a:r>
-              <a:rPr lang="zh-TW" altLang="en-US" smtClean="0"/>
+              <a:rPr lang="zh-TW" altLang="en-US"/>
               <a:t>編輯母片文字樣式</a:t>
             </a:r>
           </a:p>
           <a:p>
             <a:pPr lvl="1"/>
             <a:r>
-              <a:rPr lang="zh-TW" altLang="en-US" smtClean="0"/>
+              <a:rPr lang="zh-TW" altLang="en-US"/>
               <a:t>第二層</a:t>
             </a:r>
           </a:p>
           <a:p>
             <a:pPr lvl="2"/>
             <a:r>
-              <a:rPr lang="zh-TW" altLang="en-US" smtClean="0"/>
+              <a:rPr lang="zh-TW" altLang="en-US"/>
               <a:t>第三層</a:t>
             </a:r>
           </a:p>
           <a:p>
             <a:pPr lvl="3"/>
             <a:r>
-              <a:rPr lang="zh-TW" altLang="en-US" smtClean="0"/>
+              <a:rPr lang="zh-TW" altLang="en-US"/>
               <a:t>第四層</a:t>
             </a:r>
           </a:p>
           <a:p>
             <a:pPr lvl="4"/>
             <a:r>
-              <a:rPr lang="zh-TW" altLang="en-US" smtClean="0"/>
+              <a:rPr lang="zh-TW" altLang="en-US"/>
               <a:t>第五層</a:t>
             </a:r>
-            <a:endParaRPr lang="zh-TW" altLang="en-US"/>
           </a:p>
         </p:txBody>
       </p:sp>
@@ -1249,7 +1239,7 @@
           <a:p>
             <a:fld id="{E52FBAA3-F589-4A89-8837-2ACCD95660B2}" type="datetimeFigureOut">
               <a:rPr lang="zh-TW" altLang="en-US" smtClean="0"/>
-              <a:t>2021/5/31</a:t>
+              <a:t>2021/6/15</a:t>
             </a:fld>
             <a:endParaRPr lang="zh-TW" altLang="en-US"/>
           </a:p>
@@ -1348,10 +1338,9 @@
           <a:lstStyle/>
           <a:p>
             <a:r>
-              <a:rPr lang="zh-TW" altLang="en-US" smtClean="0"/>
+              <a:rPr lang="zh-TW" altLang="en-US"/>
               <a:t>按一下以編輯母片標題樣式</a:t>
             </a:r>
-            <a:endParaRPr lang="zh-TW" altLang="en-US"/>
           </a:p>
         </p:txBody>
       </p:sp>
@@ -1414,7 +1403,7 @@
           <a:p>
             <a:pPr lvl="0"/>
             <a:r>
-              <a:rPr lang="zh-TW" altLang="en-US" smtClean="0"/>
+              <a:rPr lang="zh-TW" altLang="en-US"/>
               <a:t>編輯母片文字樣式</a:t>
             </a:r>
           </a:p>
@@ -1442,38 +1431,37 @@
           <a:p>
             <a:pPr lvl="0"/>
             <a:r>
-              <a:rPr lang="zh-TW" altLang="en-US" smtClean="0"/>
+              <a:rPr lang="zh-TW" altLang="en-US"/>
               <a:t>編輯母片文字樣式</a:t>
             </a:r>
           </a:p>
           <a:p>
             <a:pPr lvl="1"/>
             <a:r>
-              <a:rPr lang="zh-TW" altLang="en-US" smtClean="0"/>
+              <a:rPr lang="zh-TW" altLang="en-US"/>
               <a:t>第二層</a:t>
             </a:r>
           </a:p>
           <a:p>
             <a:pPr lvl="2"/>
             <a:r>
-              <a:rPr lang="zh-TW" altLang="en-US" smtClean="0"/>
+              <a:rPr lang="zh-TW" altLang="en-US"/>
               <a:t>第三層</a:t>
             </a:r>
           </a:p>
           <a:p>
             <a:pPr lvl="3"/>
             <a:r>
-              <a:rPr lang="zh-TW" altLang="en-US" smtClean="0"/>
+              <a:rPr lang="zh-TW" altLang="en-US"/>
               <a:t>第四層</a:t>
             </a:r>
           </a:p>
           <a:p>
             <a:pPr lvl="4"/>
             <a:r>
-              <a:rPr lang="zh-TW" altLang="en-US" smtClean="0"/>
+              <a:rPr lang="zh-TW" altLang="en-US"/>
               <a:t>第五層</a:t>
             </a:r>
-            <a:endParaRPr lang="zh-TW" altLang="en-US"/>
           </a:p>
         </p:txBody>
       </p:sp>
@@ -1536,7 +1524,7 @@
           <a:p>
             <a:pPr lvl="0"/>
             <a:r>
-              <a:rPr lang="zh-TW" altLang="en-US" smtClean="0"/>
+              <a:rPr lang="zh-TW" altLang="en-US"/>
               <a:t>編輯母片文字樣式</a:t>
             </a:r>
           </a:p>
@@ -1564,38 +1552,37 @@
           <a:p>
             <a:pPr lvl="0"/>
             <a:r>
-              <a:rPr lang="zh-TW" altLang="en-US" smtClean="0"/>
+              <a:rPr lang="zh-TW" altLang="en-US"/>
               <a:t>編輯母片文字樣式</a:t>
             </a:r>
           </a:p>
           <a:p>
             <a:pPr lvl="1"/>
             <a:r>
-              <a:rPr lang="zh-TW" altLang="en-US" smtClean="0"/>
+              <a:rPr lang="zh-TW" altLang="en-US"/>
               <a:t>第二層</a:t>
             </a:r>
           </a:p>
           <a:p>
             <a:pPr lvl="2"/>
             <a:r>
-              <a:rPr lang="zh-TW" altLang="en-US" smtClean="0"/>
+              <a:rPr lang="zh-TW" altLang="en-US"/>
               <a:t>第三層</a:t>
             </a:r>
           </a:p>
           <a:p>
             <a:pPr lvl="3"/>
             <a:r>
-              <a:rPr lang="zh-TW" altLang="en-US" smtClean="0"/>
+              <a:rPr lang="zh-TW" altLang="en-US"/>
               <a:t>第四層</a:t>
             </a:r>
           </a:p>
           <a:p>
             <a:pPr lvl="4"/>
             <a:r>
-              <a:rPr lang="zh-TW" altLang="en-US" smtClean="0"/>
+              <a:rPr lang="zh-TW" altLang="en-US"/>
               <a:t>第五層</a:t>
             </a:r>
-            <a:endParaRPr lang="zh-TW" altLang="en-US"/>
           </a:p>
         </p:txBody>
       </p:sp>
@@ -1616,7 +1603,7 @@
           <a:p>
             <a:fld id="{E52FBAA3-F589-4A89-8837-2ACCD95660B2}" type="datetimeFigureOut">
               <a:rPr lang="zh-TW" altLang="en-US" smtClean="0"/>
-              <a:t>2021/5/31</a:t>
+              <a:t>2021/6/15</a:t>
             </a:fld>
             <a:endParaRPr lang="zh-TW" altLang="en-US"/>
           </a:p>
@@ -1710,10 +1697,9 @@
           <a:lstStyle/>
           <a:p>
             <a:r>
-              <a:rPr lang="zh-TW" altLang="en-US" smtClean="0"/>
+              <a:rPr lang="zh-TW" altLang="en-US"/>
               <a:t>按一下以編輯母片標題樣式</a:t>
             </a:r>
-            <a:endParaRPr lang="zh-TW" altLang="en-US"/>
           </a:p>
         </p:txBody>
       </p:sp>
@@ -1734,7 +1720,7 @@
           <a:p>
             <a:fld id="{E52FBAA3-F589-4A89-8837-2ACCD95660B2}" type="datetimeFigureOut">
               <a:rPr lang="zh-TW" altLang="en-US" smtClean="0"/>
-              <a:t>2021/5/31</a:t>
+              <a:t>2021/6/15</a:t>
             </a:fld>
             <a:endParaRPr lang="zh-TW" altLang="en-US"/>
           </a:p>
@@ -1829,7 +1815,7 @@
           <a:p>
             <a:fld id="{E52FBAA3-F589-4A89-8837-2ACCD95660B2}" type="datetimeFigureOut">
               <a:rPr lang="zh-TW" altLang="en-US" smtClean="0"/>
-              <a:t>2021/5/31</a:t>
+              <a:t>2021/6/15</a:t>
             </a:fld>
             <a:endParaRPr lang="zh-TW" altLang="en-US"/>
           </a:p>
@@ -1932,10 +1918,9 @@
           </a:lstStyle>
           <a:p>
             <a:r>
-              <a:rPr lang="zh-TW" altLang="en-US" smtClean="0"/>
+              <a:rPr lang="zh-TW" altLang="en-US"/>
               <a:t>按一下以編輯母片標題樣式</a:t>
             </a:r>
-            <a:endParaRPr lang="zh-TW" altLang="en-US"/>
           </a:p>
         </p:txBody>
       </p:sp>
@@ -1989,38 +1974,37 @@
           <a:p>
             <a:pPr lvl="0"/>
             <a:r>
-              <a:rPr lang="zh-TW" altLang="en-US" smtClean="0"/>
+              <a:rPr lang="zh-TW" altLang="en-US"/>
               <a:t>編輯母片文字樣式</a:t>
             </a:r>
           </a:p>
           <a:p>
             <a:pPr lvl="1"/>
             <a:r>
-              <a:rPr lang="zh-TW" altLang="en-US" smtClean="0"/>
+              <a:rPr lang="zh-TW" altLang="en-US"/>
               <a:t>第二層</a:t>
             </a:r>
           </a:p>
           <a:p>
             <a:pPr lvl="2"/>
             <a:r>
-              <a:rPr lang="zh-TW" altLang="en-US" smtClean="0"/>
+              <a:rPr lang="zh-TW" altLang="en-US"/>
               <a:t>第三層</a:t>
             </a:r>
           </a:p>
           <a:p>
             <a:pPr lvl="3"/>
             <a:r>
-              <a:rPr lang="zh-TW" altLang="en-US" smtClean="0"/>
+              <a:rPr lang="zh-TW" altLang="en-US"/>
               <a:t>第四層</a:t>
             </a:r>
           </a:p>
           <a:p>
             <a:pPr lvl="4"/>
             <a:r>
-              <a:rPr lang="zh-TW" altLang="en-US" smtClean="0"/>
+              <a:rPr lang="zh-TW" altLang="en-US"/>
               <a:t>第五層</a:t>
             </a:r>
-            <a:endParaRPr lang="zh-TW" altLang="en-US"/>
           </a:p>
         </p:txBody>
       </p:sp>
@@ -2083,7 +2067,7 @@
           <a:p>
             <a:pPr lvl="0"/>
             <a:r>
-              <a:rPr lang="zh-TW" altLang="en-US" smtClean="0"/>
+              <a:rPr lang="zh-TW" altLang="en-US"/>
               <a:t>編輯母片文字樣式</a:t>
             </a:r>
           </a:p>
@@ -2106,7 +2090,7 @@
           <a:p>
             <a:fld id="{E52FBAA3-F589-4A89-8837-2ACCD95660B2}" type="datetimeFigureOut">
               <a:rPr lang="zh-TW" altLang="en-US" smtClean="0"/>
-              <a:t>2021/5/31</a:t>
+              <a:t>2021/6/15</a:t>
             </a:fld>
             <a:endParaRPr lang="zh-TW" altLang="en-US"/>
           </a:p>
@@ -2209,10 +2193,9 @@
           </a:lstStyle>
           <a:p>
             <a:r>
-              <a:rPr lang="zh-TW" altLang="en-US" smtClean="0"/>
+              <a:rPr lang="zh-TW" altLang="en-US"/>
               <a:t>按一下以編輯母片標題樣式</a:t>
             </a:r>
-            <a:endParaRPr lang="zh-TW" altLang="en-US"/>
           </a:p>
         </p:txBody>
       </p:sp>
@@ -2336,7 +2319,7 @@
           <a:p>
             <a:pPr lvl="0"/>
             <a:r>
-              <a:rPr lang="zh-TW" altLang="en-US" smtClean="0"/>
+              <a:rPr lang="zh-TW" altLang="en-US"/>
               <a:t>編輯母片文字樣式</a:t>
             </a:r>
           </a:p>
@@ -2359,7 +2342,7 @@
           <a:p>
             <a:fld id="{E52FBAA3-F589-4A89-8837-2ACCD95660B2}" type="datetimeFigureOut">
               <a:rPr lang="zh-TW" altLang="en-US" smtClean="0"/>
-              <a:t>2021/5/31</a:t>
+              <a:t>2021/6/15</a:t>
             </a:fld>
             <a:endParaRPr lang="zh-TW" altLang="en-US"/>
           </a:p>
@@ -2468,10 +2451,9 @@
           <a:lstStyle/>
           <a:p>
             <a:r>
-              <a:rPr lang="zh-TW" altLang="en-US" smtClean="0"/>
+              <a:rPr lang="zh-TW" altLang="en-US"/>
               <a:t>按一下以編輯母片標題樣式</a:t>
             </a:r>
-            <a:endParaRPr lang="zh-TW" altLang="en-US"/>
           </a:p>
         </p:txBody>
       </p:sp>
@@ -2502,38 +2484,37 @@
           <a:p>
             <a:pPr lvl="0"/>
             <a:r>
-              <a:rPr lang="zh-TW" altLang="en-US" smtClean="0"/>
+              <a:rPr lang="zh-TW" altLang="en-US"/>
               <a:t>編輯母片文字樣式</a:t>
             </a:r>
           </a:p>
           <a:p>
             <a:pPr lvl="1"/>
             <a:r>
-              <a:rPr lang="zh-TW" altLang="en-US" smtClean="0"/>
+              <a:rPr lang="zh-TW" altLang="en-US"/>
               <a:t>第二層</a:t>
             </a:r>
           </a:p>
           <a:p>
             <a:pPr lvl="2"/>
             <a:r>
-              <a:rPr lang="zh-TW" altLang="en-US" smtClean="0"/>
+              <a:rPr lang="zh-TW" altLang="en-US"/>
               <a:t>第三層</a:t>
             </a:r>
           </a:p>
           <a:p>
             <a:pPr lvl="3"/>
             <a:r>
-              <a:rPr lang="zh-TW" altLang="en-US" smtClean="0"/>
+              <a:rPr lang="zh-TW" altLang="en-US"/>
               <a:t>第四層</a:t>
             </a:r>
           </a:p>
           <a:p>
             <a:pPr lvl="4"/>
             <a:r>
-              <a:rPr lang="zh-TW" altLang="en-US" smtClean="0"/>
+              <a:rPr lang="zh-TW" altLang="en-US"/>
               <a:t>第五層</a:t>
             </a:r>
-            <a:endParaRPr lang="zh-TW" altLang="en-US"/>
           </a:p>
         </p:txBody>
       </p:sp>
@@ -2572,7 +2553,7 @@
           <a:p>
             <a:fld id="{E52FBAA3-F589-4A89-8837-2ACCD95660B2}" type="datetimeFigureOut">
               <a:rPr lang="zh-TW" altLang="en-US" smtClean="0"/>
-              <a:t>2021/5/31</a:t>
+              <a:t>2021/6/15</a:t>
             </a:fld>
             <a:endParaRPr lang="zh-TW" altLang="en-US"/>
           </a:p>
@@ -3000,25 +2981,16 @@
           <a:lstStyle/>
           <a:p>
             <a:r>
-              <a:rPr lang="en-US" altLang="zh-TW" dirty="0" smtClean="0"/>
+              <a:rPr lang="en-US" altLang="zh-TW" dirty="0"/>
               <a:t>Final Project</a:t>
             </a:r>
             <a:br>
-              <a:rPr lang="en-US" altLang="zh-TW" dirty="0" smtClean="0"/>
+              <a:rPr lang="en-US" altLang="zh-TW" dirty="0"/>
             </a:br>
             <a:r>
-              <a:rPr lang="en-US" altLang="zh-TW" sz="4400" dirty="0" smtClean="0"/>
-              <a:t>Conjugate </a:t>
-            </a:r>
-            <a:r>
               <a:rPr lang="en-US" altLang="zh-TW" sz="4400" dirty="0"/>
-              <a:t>Gradient </a:t>
-            </a:r>
-            <a:r>
-              <a:rPr lang="en-US" altLang="zh-TW" sz="4400" dirty="0" smtClean="0"/>
-              <a:t>Poisson Solver</a:t>
-            </a:r>
-            <a:endParaRPr lang="en-US" altLang="zh-TW" sz="4400" dirty="0"/>
+              <a:t>Conjugate Gradient Poisson Solver</a:t>
+            </a:r>
           </a:p>
         </p:txBody>
       </p:sp>
@@ -3044,14 +3016,14 @@
           <a:p>
             <a:pPr algn="r"/>
             <a:r>
-              <a:rPr lang="en-US" altLang="zh-TW" dirty="0" smtClean="0"/>
+              <a:rPr lang="en-US" altLang="zh-TW" dirty="0"/>
               <a:t>R08222060 </a:t>
             </a:r>
             <a:r>
-              <a:rPr lang="zh-TW" altLang="en-US" dirty="0" smtClean="0"/>
+              <a:rPr lang="zh-TW" altLang="en-US" dirty="0"/>
               <a:t>物理碩二 陳琦畯</a:t>
             </a:r>
-            <a:endParaRPr lang="en-US" altLang="zh-TW" dirty="0" smtClean="0"/>
+            <a:endParaRPr lang="en-US" altLang="zh-TW" dirty="0"/>
           </a:p>
         </p:txBody>
       </p:sp>
@@ -3059,6 +3031,1150 @@
     <p:extLst>
       <p:ext uri="{BB962C8B-B14F-4D97-AF65-F5344CB8AC3E}">
         <p14:creationId xmlns:p14="http://schemas.microsoft.com/office/powerpoint/2010/main" val="1599759663"/>
+      </p:ext>
+    </p:extLst>
+  </p:cSld>
+  <p:clrMapOvr>
+    <a:masterClrMapping/>
+  </p:clrMapOvr>
+</p:sld>
+</file>
+
+<file path=ppt/slides/slide10.xml><?xml version="1.0" encoding="utf-8"?>
+<p:sld xmlns:a="http://schemas.openxmlformats.org/drawingml/2006/main" xmlns:r="http://schemas.openxmlformats.org/officeDocument/2006/relationships" xmlns:p="http://schemas.openxmlformats.org/presentationml/2006/main">
+  <p:cSld>
+    <p:spTree>
+      <p:nvGrpSpPr>
+        <p:cNvPr id="1" name=""/>
+        <p:cNvGrpSpPr/>
+        <p:nvPr/>
+      </p:nvGrpSpPr>
+      <p:grpSpPr>
+        <a:xfrm>
+          <a:off x="0" y="0"/>
+          <a:ext cx="0" cy="0"/>
+          <a:chOff x="0" y="0"/>
+          <a:chExt cx="0" cy="0"/>
+        </a:xfrm>
+      </p:grpSpPr>
+      <p:graphicFrame>
+        <p:nvGraphicFramePr>
+          <p:cNvPr id="2" name="Table 2">
+            <a:extLst>
+              <a:ext uri="{FF2B5EF4-FFF2-40B4-BE49-F238E27FC236}">
+                <a16:creationId xmlns:a16="http://schemas.microsoft.com/office/drawing/2014/main" id="{361A48B3-70BF-AD43-8635-974A530E8A62}"/>
+              </a:ext>
+            </a:extLst>
+          </p:cNvPr>
+          <p:cNvGraphicFramePr>
+            <a:graphicFrameLocks noGrp="1"/>
+          </p:cNvGraphicFramePr>
+          <p:nvPr>
+            <p:extLst>
+              <p:ext uri="{D42A27DB-BD31-4B8C-83A1-F6EECF244321}">
+                <p14:modId xmlns:p14="http://schemas.microsoft.com/office/powerpoint/2010/main" val="3382164396"/>
+              </p:ext>
+            </p:extLst>
+          </p:nvPr>
+        </p:nvGraphicFramePr>
+        <p:xfrm>
+          <a:off x="1699740" y="1690688"/>
+          <a:ext cx="8792520" cy="1464822"/>
+        </p:xfrm>
+        <a:graphic>
+          <a:graphicData uri="http://schemas.openxmlformats.org/drawingml/2006/table">
+            <a:tbl>
+              <a:tblPr firstRow="1" bandRow="1">
+                <a:tableStyleId>{5C22544A-7EE6-4342-B048-85BDC9FD1C3A}</a:tableStyleId>
+              </a:tblPr>
+              <a:tblGrid>
+                <a:gridCol w="1758504">
+                  <a:extLst>
+                    <a:ext uri="{9D8B030D-6E8A-4147-A177-3AD203B41FA5}">
+                      <a16:colId xmlns:a16="http://schemas.microsoft.com/office/drawing/2014/main" val="10454311"/>
+                    </a:ext>
+                  </a:extLst>
+                </a:gridCol>
+                <a:gridCol w="1758504">
+                  <a:extLst>
+                    <a:ext uri="{9D8B030D-6E8A-4147-A177-3AD203B41FA5}">
+                      <a16:colId xmlns:a16="http://schemas.microsoft.com/office/drawing/2014/main" val="1630364256"/>
+                    </a:ext>
+                  </a:extLst>
+                </a:gridCol>
+                <a:gridCol w="1758504">
+                  <a:extLst>
+                    <a:ext uri="{9D8B030D-6E8A-4147-A177-3AD203B41FA5}">
+                      <a16:colId xmlns:a16="http://schemas.microsoft.com/office/drawing/2014/main" val="4051651895"/>
+                    </a:ext>
+                  </a:extLst>
+                </a:gridCol>
+                <a:gridCol w="1758504">
+                  <a:extLst>
+                    <a:ext uri="{9D8B030D-6E8A-4147-A177-3AD203B41FA5}">
+                      <a16:colId xmlns:a16="http://schemas.microsoft.com/office/drawing/2014/main" val="3155073764"/>
+                    </a:ext>
+                  </a:extLst>
+                </a:gridCol>
+                <a:gridCol w="1758504">
+                  <a:extLst>
+                    <a:ext uri="{9D8B030D-6E8A-4147-A177-3AD203B41FA5}">
+                      <a16:colId xmlns:a16="http://schemas.microsoft.com/office/drawing/2014/main" val="3258694887"/>
+                    </a:ext>
+                  </a:extLst>
+                </a:gridCol>
+              </a:tblGrid>
+              <a:tr h="488274">
+                <a:tc>
+                  <a:txBody>
+                    <a:bodyPr/>
+                    <a:lstStyle/>
+                    <a:p>
+                      <a:pPr algn="ctr"/>
+                      <a:r>
+                        <a:rPr lang="en-TW" dirty="0"/>
+                        <a:t>N = 1024</a:t>
+                      </a:r>
+                    </a:p>
+                  </a:txBody>
+                  <a:tcPr anchor="ctr"/>
+                </a:tc>
+                <a:tc>
+                  <a:txBody>
+                    <a:bodyPr/>
+                    <a:lstStyle/>
+                    <a:p>
+                      <a:pPr algn="ctr"/>
+                      <a:r>
+                        <a:rPr lang="en-TW" dirty="0"/>
+                        <a:t>1</a:t>
+                      </a:r>
+                    </a:p>
+                  </a:txBody>
+                  <a:tcPr anchor="ctr"/>
+                </a:tc>
+                <a:tc>
+                  <a:txBody>
+                    <a:bodyPr/>
+                    <a:lstStyle/>
+                    <a:p>
+                      <a:pPr algn="ctr"/>
+                      <a:r>
+                        <a:rPr lang="en-TW" dirty="0"/>
+                        <a:t>2</a:t>
+                      </a:r>
+                    </a:p>
+                  </a:txBody>
+                  <a:tcPr anchor="ctr"/>
+                </a:tc>
+                <a:tc>
+                  <a:txBody>
+                    <a:bodyPr/>
+                    <a:lstStyle/>
+                    <a:p>
+                      <a:pPr algn="ctr"/>
+                      <a:r>
+                        <a:rPr lang="en-TW" dirty="0"/>
+                        <a:t>4</a:t>
+                      </a:r>
+                    </a:p>
+                  </a:txBody>
+                  <a:tcPr anchor="ctr"/>
+                </a:tc>
+                <a:tc>
+                  <a:txBody>
+                    <a:bodyPr/>
+                    <a:lstStyle/>
+                    <a:p>
+                      <a:pPr algn="ctr"/>
+                      <a:r>
+                        <a:rPr lang="en-TW" dirty="0"/>
+                        <a:t>8</a:t>
+                      </a:r>
+                    </a:p>
+                  </a:txBody>
+                  <a:tcPr anchor="ctr"/>
+                </a:tc>
+                <a:extLst>
+                  <a:ext uri="{0D108BD9-81ED-4DB2-BD59-A6C34878D82A}">
+                    <a16:rowId xmlns:a16="http://schemas.microsoft.com/office/drawing/2014/main" val="1357623893"/>
+                  </a:ext>
+                </a:extLst>
+              </a:tr>
+              <a:tr h="488274">
+                <a:tc>
+                  <a:txBody>
+                    <a:bodyPr/>
+                    <a:lstStyle/>
+                    <a:p>
+                      <a:pPr algn="ctr"/>
+                      <a:r>
+                        <a:rPr lang="en-TW" dirty="0"/>
+                        <a:t>SOR</a:t>
+                      </a:r>
+                    </a:p>
+                  </a:txBody>
+                  <a:tcPr anchor="ctr"/>
+                </a:tc>
+                <a:tc>
+                  <a:txBody>
+                    <a:bodyPr/>
+                    <a:lstStyle/>
+                    <a:p>
+                      <a:pPr algn="ctr"/>
+                      <a:r>
+                        <a:rPr lang="en-TW" dirty="0"/>
+                        <a:t>15.553</a:t>
+                      </a:r>
+                    </a:p>
+                  </a:txBody>
+                  <a:tcPr anchor="ctr"/>
+                </a:tc>
+                <a:tc>
+                  <a:txBody>
+                    <a:bodyPr/>
+                    <a:lstStyle/>
+                    <a:p>
+                      <a:pPr algn="ctr"/>
+                      <a:r>
+                        <a:rPr lang="en-TW" dirty="0"/>
+                        <a:t>8.403</a:t>
+                      </a:r>
+                    </a:p>
+                  </a:txBody>
+                  <a:tcPr anchor="ctr"/>
+                </a:tc>
+                <a:tc>
+                  <a:txBody>
+                    <a:bodyPr/>
+                    <a:lstStyle/>
+                    <a:p>
+                      <a:pPr algn="ctr"/>
+                      <a:r>
+                        <a:rPr lang="en-TW" dirty="0"/>
+                        <a:t>4.666</a:t>
+                      </a:r>
+                    </a:p>
+                  </a:txBody>
+                  <a:tcPr anchor="ctr"/>
+                </a:tc>
+                <a:tc>
+                  <a:txBody>
+                    <a:bodyPr/>
+                    <a:lstStyle/>
+                    <a:p>
+                      <a:pPr algn="ctr"/>
+                      <a:r>
+                        <a:rPr lang="en-TW" dirty="0"/>
+                        <a:t>4.990</a:t>
+                      </a:r>
+                    </a:p>
+                  </a:txBody>
+                  <a:tcPr anchor="ctr"/>
+                </a:tc>
+                <a:extLst>
+                  <a:ext uri="{0D108BD9-81ED-4DB2-BD59-A6C34878D82A}">
+                    <a16:rowId xmlns:a16="http://schemas.microsoft.com/office/drawing/2014/main" val="2380938986"/>
+                  </a:ext>
+                </a:extLst>
+              </a:tr>
+              <a:tr h="488274">
+                <a:tc>
+                  <a:txBody>
+                    <a:bodyPr/>
+                    <a:lstStyle/>
+                    <a:p>
+                      <a:pPr algn="ctr"/>
+                      <a:r>
+                        <a:rPr lang="en-TW" dirty="0"/>
+                        <a:t>CG</a:t>
+                      </a:r>
+                    </a:p>
+                  </a:txBody>
+                  <a:tcPr anchor="ctr"/>
+                </a:tc>
+                <a:tc>
+                  <a:txBody>
+                    <a:bodyPr/>
+                    <a:lstStyle/>
+                    <a:p>
+                      <a:pPr algn="ctr"/>
+                      <a:r>
+                        <a:rPr lang="en-TW" dirty="0"/>
+                        <a:t>14.689</a:t>
+                      </a:r>
+                    </a:p>
+                  </a:txBody>
+                  <a:tcPr anchor="ctr"/>
+                </a:tc>
+                <a:tc>
+                  <a:txBody>
+                    <a:bodyPr/>
+                    <a:lstStyle/>
+                    <a:p>
+                      <a:pPr algn="ctr"/>
+                      <a:r>
+                        <a:rPr lang="en-TW" dirty="0"/>
+                        <a:t>14.776</a:t>
+                      </a:r>
+                    </a:p>
+                  </a:txBody>
+                  <a:tcPr anchor="ctr"/>
+                </a:tc>
+                <a:tc>
+                  <a:txBody>
+                    <a:bodyPr/>
+                    <a:lstStyle/>
+                    <a:p>
+                      <a:pPr algn="ctr"/>
+                      <a:r>
+                        <a:rPr lang="en-TW" dirty="0"/>
+                        <a:t>14.741</a:t>
+                      </a:r>
+                    </a:p>
+                  </a:txBody>
+                  <a:tcPr anchor="ctr"/>
+                </a:tc>
+                <a:tc>
+                  <a:txBody>
+                    <a:bodyPr/>
+                    <a:lstStyle/>
+                    <a:p>
+                      <a:pPr algn="ctr"/>
+                      <a:r>
+                        <a:rPr lang="en-TW" dirty="0"/>
+                        <a:t>14.422</a:t>
+                      </a:r>
+                    </a:p>
+                  </a:txBody>
+                  <a:tcPr anchor="ctr"/>
+                </a:tc>
+                <a:extLst>
+                  <a:ext uri="{0D108BD9-81ED-4DB2-BD59-A6C34878D82A}">
+                    <a16:rowId xmlns:a16="http://schemas.microsoft.com/office/drawing/2014/main" val="767737053"/>
+                  </a:ext>
+                </a:extLst>
+              </a:tr>
+            </a:tbl>
+          </a:graphicData>
+        </a:graphic>
+      </p:graphicFrame>
+      <p:sp>
+        <p:nvSpPr>
+          <p:cNvPr id="3" name="Title 2">
+            <a:extLst>
+              <a:ext uri="{FF2B5EF4-FFF2-40B4-BE49-F238E27FC236}">
+                <a16:creationId xmlns:a16="http://schemas.microsoft.com/office/drawing/2014/main" id="{499DAB2E-59A6-084B-955A-041BFCEC4597}"/>
+              </a:ext>
+            </a:extLst>
+          </p:cNvPr>
+          <p:cNvSpPr>
+            <a:spLocks noGrp="1"/>
+          </p:cNvSpPr>
+          <p:nvPr>
+            <p:ph type="title"/>
+          </p:nvPr>
+        </p:nvSpPr>
+        <p:spPr/>
+        <p:txBody>
+          <a:bodyPr/>
+          <a:lstStyle/>
+          <a:p>
+            <a:r>
+              <a:rPr lang="en-TW" dirty="0"/>
+              <a:t>Multi-Threads Performance Comparison</a:t>
+            </a:r>
+          </a:p>
+        </p:txBody>
+      </p:sp>
+      <p:pic>
+        <p:nvPicPr>
+          <p:cNvPr id="7" name="Picture 6">
+            <a:extLst>
+              <a:ext uri="{FF2B5EF4-FFF2-40B4-BE49-F238E27FC236}">
+                <a16:creationId xmlns:a16="http://schemas.microsoft.com/office/drawing/2014/main" id="{F4328BA1-6FC6-EE46-9204-36789143FAA0}"/>
+              </a:ext>
+            </a:extLst>
+          </p:cNvPr>
+          <p:cNvPicPr>
+            <a:picLocks noChangeAspect="1"/>
+          </p:cNvPicPr>
+          <p:nvPr/>
+        </p:nvPicPr>
+        <p:blipFill>
+          <a:blip r:embed="rId2">
+            <a:extLst>
+              <a:ext uri="{28A0092B-C50C-407E-A947-70E740481C1C}">
+                <a14:useLocalDpi xmlns:a14="http://schemas.microsoft.com/office/drawing/2010/main" val="0"/>
+              </a:ext>
+            </a:extLst>
+          </a:blip>
+          <a:stretch>
+            <a:fillRect/>
+          </a:stretch>
+        </p:blipFill>
+        <p:spPr>
+          <a:xfrm>
+            <a:off x="7629782" y="3282368"/>
+            <a:ext cx="4562218" cy="3649774"/>
+          </a:xfrm>
+          <a:prstGeom prst="rect">
+            <a:avLst/>
+          </a:prstGeom>
+        </p:spPr>
+      </p:pic>
+      <p:sp>
+        <p:nvSpPr>
+          <p:cNvPr id="8" name="TextBox 7">
+            <a:extLst>
+              <a:ext uri="{FF2B5EF4-FFF2-40B4-BE49-F238E27FC236}">
+                <a16:creationId xmlns:a16="http://schemas.microsoft.com/office/drawing/2014/main" id="{745BA77F-A750-894E-8CD8-9D55EEA095EC}"/>
+              </a:ext>
+            </a:extLst>
+          </p:cNvPr>
+          <p:cNvSpPr txBox="1"/>
+          <p:nvPr/>
+        </p:nvSpPr>
+        <p:spPr>
+          <a:xfrm>
+            <a:off x="1699740" y="3220583"/>
+            <a:ext cx="5362832" cy="646331"/>
+          </a:xfrm>
+          <a:prstGeom prst="rect">
+            <a:avLst/>
+          </a:prstGeom>
+          <a:noFill/>
+        </p:spPr>
+        <p:txBody>
+          <a:bodyPr wrap="square" rtlCol="0">
+            <a:spAutoFit/>
+          </a:bodyPr>
+          <a:lstStyle/>
+          <a:p>
+            <a:r>
+              <a:rPr lang="en-TW" dirty="0"/>
+              <a:t>Machine : Macbook Pro M1 with 4+4 Cores CPU</a:t>
+            </a:r>
+          </a:p>
+          <a:p>
+            <a:r>
+              <a:rPr lang="en-TW" dirty="0"/>
+              <a:t>Domain : 1024 * 1024</a:t>
+            </a:r>
+          </a:p>
+        </p:txBody>
+      </p:sp>
+      <p:sp>
+        <p:nvSpPr>
+          <p:cNvPr id="9" name="TextBox 8">
+            <a:extLst>
+              <a:ext uri="{FF2B5EF4-FFF2-40B4-BE49-F238E27FC236}">
+                <a16:creationId xmlns:a16="http://schemas.microsoft.com/office/drawing/2014/main" id="{B5AA283F-22C5-704D-972B-B3A6965A3FDD}"/>
+              </a:ext>
+            </a:extLst>
+          </p:cNvPr>
+          <p:cNvSpPr txBox="1"/>
+          <p:nvPr/>
+        </p:nvSpPr>
+        <p:spPr>
+          <a:xfrm>
+            <a:off x="9160948" y="3318476"/>
+            <a:ext cx="1499887" cy="369332"/>
+          </a:xfrm>
+          <a:prstGeom prst="rect">
+            <a:avLst/>
+          </a:prstGeom>
+          <a:noFill/>
+        </p:spPr>
+        <p:txBody>
+          <a:bodyPr wrap="square" rtlCol="0">
+            <a:spAutoFit/>
+          </a:bodyPr>
+          <a:lstStyle/>
+          <a:p>
+            <a:pPr algn="ctr"/>
+            <a:r>
+              <a:rPr lang="en-TW" dirty="0"/>
+              <a:t>Point Source</a:t>
+            </a:r>
+          </a:p>
+        </p:txBody>
+      </p:sp>
+      <p:sp>
+        <p:nvSpPr>
+          <p:cNvPr id="10" name="TextBox 9">
+            <a:extLst>
+              <a:ext uri="{FF2B5EF4-FFF2-40B4-BE49-F238E27FC236}">
+                <a16:creationId xmlns:a16="http://schemas.microsoft.com/office/drawing/2014/main" id="{6657C9B4-6423-9040-A4A3-5B1A4A04F0B0}"/>
+              </a:ext>
+            </a:extLst>
+          </p:cNvPr>
+          <p:cNvSpPr txBox="1"/>
+          <p:nvPr/>
+        </p:nvSpPr>
+        <p:spPr>
+          <a:xfrm>
+            <a:off x="5954287" y="6185328"/>
+            <a:ext cx="2314833" cy="369332"/>
+          </a:xfrm>
+          <a:prstGeom prst="rect">
+            <a:avLst/>
+          </a:prstGeom>
+          <a:noFill/>
+        </p:spPr>
+        <p:txBody>
+          <a:bodyPr wrap="square" rtlCol="0">
+            <a:spAutoFit/>
+          </a:bodyPr>
+          <a:lstStyle/>
+          <a:p>
+            <a:r>
+              <a:rPr lang="en-TW" dirty="0"/>
+              <a:t>Boundary Condition</a:t>
+            </a:r>
+          </a:p>
+        </p:txBody>
+      </p:sp>
+    </p:spTree>
+    <p:extLst>
+      <p:ext uri="{BB962C8B-B14F-4D97-AF65-F5344CB8AC3E}">
+        <p14:creationId xmlns:p14="http://schemas.microsoft.com/office/powerpoint/2010/main" val="2642638562"/>
+      </p:ext>
+    </p:extLst>
+  </p:cSld>
+  <p:clrMapOvr>
+    <a:masterClrMapping/>
+  </p:clrMapOvr>
+</p:sld>
+</file>
+
+<file path=ppt/slides/slide11.xml><?xml version="1.0" encoding="utf-8"?>
+<p:sld xmlns:a="http://schemas.openxmlformats.org/drawingml/2006/main" xmlns:r="http://schemas.openxmlformats.org/officeDocument/2006/relationships" xmlns:p="http://schemas.openxmlformats.org/presentationml/2006/main">
+  <p:cSld>
+    <p:spTree>
+      <p:nvGrpSpPr>
+        <p:cNvPr id="1" name=""/>
+        <p:cNvGrpSpPr/>
+        <p:nvPr/>
+      </p:nvGrpSpPr>
+      <p:grpSpPr>
+        <a:xfrm>
+          <a:off x="0" y="0"/>
+          <a:ext cx="0" cy="0"/>
+          <a:chOff x="0" y="0"/>
+          <a:chExt cx="0" cy="0"/>
+        </a:xfrm>
+      </p:grpSpPr>
+      <p:graphicFrame>
+        <p:nvGraphicFramePr>
+          <p:cNvPr id="5" name="Table 2">
+            <a:extLst>
+              <a:ext uri="{FF2B5EF4-FFF2-40B4-BE49-F238E27FC236}">
+                <a16:creationId xmlns:a16="http://schemas.microsoft.com/office/drawing/2014/main" id="{836EB9CB-C1F4-A746-81ED-50810C6800C5}"/>
+              </a:ext>
+            </a:extLst>
+          </p:cNvPr>
+          <p:cNvGraphicFramePr>
+            <a:graphicFrameLocks noGrp="1"/>
+          </p:cNvGraphicFramePr>
+          <p:nvPr>
+            <p:extLst>
+              <p:ext uri="{D42A27DB-BD31-4B8C-83A1-F6EECF244321}">
+                <p14:modId xmlns:p14="http://schemas.microsoft.com/office/powerpoint/2010/main" val="749704263"/>
+              </p:ext>
+            </p:extLst>
+          </p:nvPr>
+        </p:nvGraphicFramePr>
+        <p:xfrm>
+          <a:off x="1230792" y="1690688"/>
+          <a:ext cx="9730416" cy="1461600"/>
+        </p:xfrm>
+        <a:graphic>
+          <a:graphicData uri="http://schemas.openxmlformats.org/drawingml/2006/table">
+            <a:tbl>
+              <a:tblPr firstRow="1" bandRow="1">
+                <a:tableStyleId>{5C22544A-7EE6-4342-B048-85BDC9FD1C3A}</a:tableStyleId>
+              </a:tblPr>
+              <a:tblGrid>
+                <a:gridCol w="1216302">
+                  <a:extLst>
+                    <a:ext uri="{9D8B030D-6E8A-4147-A177-3AD203B41FA5}">
+                      <a16:colId xmlns:a16="http://schemas.microsoft.com/office/drawing/2014/main" val="10454311"/>
+                    </a:ext>
+                  </a:extLst>
+                </a:gridCol>
+                <a:gridCol w="1216302">
+                  <a:extLst>
+                    <a:ext uri="{9D8B030D-6E8A-4147-A177-3AD203B41FA5}">
+                      <a16:colId xmlns:a16="http://schemas.microsoft.com/office/drawing/2014/main" val="1630364256"/>
+                    </a:ext>
+                  </a:extLst>
+                </a:gridCol>
+                <a:gridCol w="1216302">
+                  <a:extLst>
+                    <a:ext uri="{9D8B030D-6E8A-4147-A177-3AD203B41FA5}">
+                      <a16:colId xmlns:a16="http://schemas.microsoft.com/office/drawing/2014/main" val="4051651895"/>
+                    </a:ext>
+                  </a:extLst>
+                </a:gridCol>
+                <a:gridCol w="1216302">
+                  <a:extLst>
+                    <a:ext uri="{9D8B030D-6E8A-4147-A177-3AD203B41FA5}">
+                      <a16:colId xmlns:a16="http://schemas.microsoft.com/office/drawing/2014/main" val="3155073764"/>
+                    </a:ext>
+                  </a:extLst>
+                </a:gridCol>
+                <a:gridCol w="1216302">
+                  <a:extLst>
+                    <a:ext uri="{9D8B030D-6E8A-4147-A177-3AD203B41FA5}">
+                      <a16:colId xmlns:a16="http://schemas.microsoft.com/office/drawing/2014/main" val="3258694887"/>
+                    </a:ext>
+                  </a:extLst>
+                </a:gridCol>
+                <a:gridCol w="1216302">
+                  <a:extLst>
+                    <a:ext uri="{9D8B030D-6E8A-4147-A177-3AD203B41FA5}">
+                      <a16:colId xmlns:a16="http://schemas.microsoft.com/office/drawing/2014/main" val="2817309546"/>
+                    </a:ext>
+                  </a:extLst>
+                </a:gridCol>
+                <a:gridCol w="1216302">
+                  <a:extLst>
+                    <a:ext uri="{9D8B030D-6E8A-4147-A177-3AD203B41FA5}">
+                      <a16:colId xmlns:a16="http://schemas.microsoft.com/office/drawing/2014/main" val="925743817"/>
+                    </a:ext>
+                  </a:extLst>
+                </a:gridCol>
+                <a:gridCol w="1216302">
+                  <a:extLst>
+                    <a:ext uri="{9D8B030D-6E8A-4147-A177-3AD203B41FA5}">
+                      <a16:colId xmlns:a16="http://schemas.microsoft.com/office/drawing/2014/main" val="2140396958"/>
+                    </a:ext>
+                  </a:extLst>
+                </a:gridCol>
+              </a:tblGrid>
+              <a:tr h="487200">
+                <a:tc>
+                  <a:txBody>
+                    <a:bodyPr/>
+                    <a:lstStyle/>
+                    <a:p>
+                      <a:pPr algn="ctr"/>
+                      <a:endParaRPr lang="en-TW" dirty="0"/>
+                    </a:p>
+                  </a:txBody>
+                  <a:tcPr anchor="ctr"/>
+                </a:tc>
+                <a:tc>
+                  <a:txBody>
+                    <a:bodyPr/>
+                    <a:lstStyle/>
+                    <a:p>
+                      <a:pPr algn="ctr"/>
+                      <a:r>
+                        <a:rPr lang="en-TW" dirty="0"/>
+                        <a:t>N = 16</a:t>
+                      </a:r>
+                    </a:p>
+                  </a:txBody>
+                  <a:tcPr anchor="ctr"/>
+                </a:tc>
+                <a:tc>
+                  <a:txBody>
+                    <a:bodyPr/>
+                    <a:lstStyle/>
+                    <a:p>
+                      <a:pPr algn="ctr"/>
+                      <a:r>
+                        <a:rPr lang="en-TW" dirty="0"/>
+                        <a:t>N = 32</a:t>
+                      </a:r>
+                    </a:p>
+                  </a:txBody>
+                  <a:tcPr anchor="ctr"/>
+                </a:tc>
+                <a:tc>
+                  <a:txBody>
+                    <a:bodyPr/>
+                    <a:lstStyle/>
+                    <a:p>
+                      <a:pPr algn="ctr"/>
+                      <a:r>
+                        <a:rPr lang="en-TW" dirty="0"/>
+                        <a:t>N = 64</a:t>
+                      </a:r>
+                    </a:p>
+                  </a:txBody>
+                  <a:tcPr anchor="ctr"/>
+                </a:tc>
+                <a:tc>
+                  <a:txBody>
+                    <a:bodyPr/>
+                    <a:lstStyle/>
+                    <a:p>
+                      <a:pPr algn="ctr"/>
+                      <a:r>
+                        <a:rPr lang="en-US" dirty="0"/>
+                        <a:t>N</a:t>
+                      </a:r>
+                      <a:r>
+                        <a:rPr lang="en-TW" dirty="0"/>
+                        <a:t> = 128</a:t>
+                      </a:r>
+                    </a:p>
+                  </a:txBody>
+                  <a:tcPr anchor="ctr"/>
+                </a:tc>
+                <a:tc>
+                  <a:txBody>
+                    <a:bodyPr/>
+                    <a:lstStyle/>
+                    <a:p>
+                      <a:pPr algn="ctr"/>
+                      <a:r>
+                        <a:rPr lang="en-TW" dirty="0"/>
+                        <a:t>N = 256</a:t>
+                      </a:r>
+                    </a:p>
+                  </a:txBody>
+                  <a:tcPr anchor="ctr"/>
+                </a:tc>
+                <a:tc>
+                  <a:txBody>
+                    <a:bodyPr/>
+                    <a:lstStyle/>
+                    <a:p>
+                      <a:pPr algn="ctr"/>
+                      <a:r>
+                        <a:rPr lang="en-TW" dirty="0"/>
+                        <a:t>N = 512</a:t>
+                      </a:r>
+                    </a:p>
+                  </a:txBody>
+                  <a:tcPr anchor="ctr"/>
+                </a:tc>
+                <a:tc>
+                  <a:txBody>
+                    <a:bodyPr/>
+                    <a:lstStyle/>
+                    <a:p>
+                      <a:pPr marL="0" marR="0" lvl="0" indent="0" algn="ctr" defTabSz="914400" rtl="0" eaLnBrk="1" fontAlgn="auto" latinLnBrk="0" hangingPunct="1">
+                        <a:lnSpc>
+                          <a:spcPct val="100000"/>
+                        </a:lnSpc>
+                        <a:spcBef>
+                          <a:spcPts val="0"/>
+                        </a:spcBef>
+                        <a:spcAft>
+                          <a:spcPts val="0"/>
+                        </a:spcAft>
+                        <a:buClrTx/>
+                        <a:buSzTx/>
+                        <a:buFontTx/>
+                        <a:buNone/>
+                        <a:tabLst/>
+                        <a:defRPr/>
+                      </a:pPr>
+                      <a:r>
+                        <a:rPr lang="en-TW" dirty="0"/>
+                        <a:t>N = 1024</a:t>
+                      </a:r>
+                    </a:p>
+                  </a:txBody>
+                  <a:tcPr anchor="ctr"/>
+                </a:tc>
+                <a:extLst>
+                  <a:ext uri="{0D108BD9-81ED-4DB2-BD59-A6C34878D82A}">
+                    <a16:rowId xmlns:a16="http://schemas.microsoft.com/office/drawing/2014/main" val="1357623893"/>
+                  </a:ext>
+                </a:extLst>
+              </a:tr>
+              <a:tr h="487200">
+                <a:tc>
+                  <a:txBody>
+                    <a:bodyPr/>
+                    <a:lstStyle/>
+                    <a:p>
+                      <a:pPr algn="ctr"/>
+                      <a:r>
+                        <a:rPr lang="en-TW" dirty="0"/>
+                        <a:t>SOR</a:t>
+                      </a:r>
+                    </a:p>
+                  </a:txBody>
+                  <a:tcPr anchor="ctr"/>
+                </a:tc>
+                <a:tc>
+                  <a:txBody>
+                    <a:bodyPr/>
+                    <a:lstStyle/>
+                    <a:p>
+                      <a:pPr algn="ctr"/>
+                      <a:r>
+                        <a:rPr lang="en-TW" dirty="0"/>
+                        <a:t>9.527e-15</a:t>
+                      </a:r>
+                    </a:p>
+                  </a:txBody>
+                  <a:tcPr anchor="ctr"/>
+                </a:tc>
+                <a:tc>
+                  <a:txBody>
+                    <a:bodyPr/>
+                    <a:lstStyle/>
+                    <a:p>
+                      <a:pPr algn="ctr"/>
+                      <a:r>
+                        <a:rPr lang="en-TW" dirty="0"/>
+                        <a:t>9.950e-15</a:t>
+                      </a:r>
+                    </a:p>
+                  </a:txBody>
+                  <a:tcPr anchor="ctr"/>
+                </a:tc>
+                <a:tc>
+                  <a:txBody>
+                    <a:bodyPr/>
+                    <a:lstStyle/>
+                    <a:p>
+                      <a:pPr algn="ctr"/>
+                      <a:r>
+                        <a:rPr lang="en-TW" dirty="0"/>
+                        <a:t>9.214e-15</a:t>
+                      </a:r>
+                    </a:p>
+                  </a:txBody>
+                  <a:tcPr anchor="ctr"/>
+                </a:tc>
+                <a:tc>
+                  <a:txBody>
+                    <a:bodyPr/>
+                    <a:lstStyle/>
+                    <a:p>
+                      <a:pPr algn="ctr"/>
+                      <a:r>
+                        <a:rPr lang="en-TW" dirty="0"/>
+                        <a:t>9.862e-15</a:t>
+                      </a:r>
+                    </a:p>
+                  </a:txBody>
+                  <a:tcPr anchor="ctr"/>
+                </a:tc>
+                <a:tc>
+                  <a:txBody>
+                    <a:bodyPr/>
+                    <a:lstStyle/>
+                    <a:p>
+                      <a:pPr algn="ctr"/>
+                      <a:r>
+                        <a:rPr lang="en-TW" dirty="0"/>
+                        <a:t>9.968e-15</a:t>
+                      </a:r>
+                    </a:p>
+                  </a:txBody>
+                  <a:tcPr anchor="ctr"/>
+                </a:tc>
+                <a:tc>
+                  <a:txBody>
+                    <a:bodyPr/>
+                    <a:lstStyle/>
+                    <a:p>
+                      <a:pPr algn="ctr"/>
+                      <a:r>
+                        <a:rPr lang="en-TW" dirty="0"/>
+                        <a:t>9.953e-15</a:t>
+                      </a:r>
+                    </a:p>
+                  </a:txBody>
+                  <a:tcPr anchor="ctr"/>
+                </a:tc>
+                <a:tc>
+                  <a:txBody>
+                    <a:bodyPr/>
+                    <a:lstStyle/>
+                    <a:p>
+                      <a:pPr algn="ctr"/>
+                      <a:r>
+                        <a:rPr lang="en-TW" dirty="0"/>
+                        <a:t>9.971e-15</a:t>
+                      </a:r>
+                    </a:p>
+                  </a:txBody>
+                  <a:tcPr anchor="ctr"/>
+                </a:tc>
+                <a:extLst>
+                  <a:ext uri="{0D108BD9-81ED-4DB2-BD59-A6C34878D82A}">
+                    <a16:rowId xmlns:a16="http://schemas.microsoft.com/office/drawing/2014/main" val="2380938986"/>
+                  </a:ext>
+                </a:extLst>
+              </a:tr>
+              <a:tr h="487200">
+                <a:tc>
+                  <a:txBody>
+                    <a:bodyPr/>
+                    <a:lstStyle/>
+                    <a:p>
+                      <a:pPr algn="ctr"/>
+                      <a:r>
+                        <a:rPr lang="en-TW" dirty="0"/>
+                        <a:t>CG</a:t>
+                      </a:r>
+                    </a:p>
+                  </a:txBody>
+                  <a:tcPr anchor="ctr"/>
+                </a:tc>
+                <a:tc>
+                  <a:txBody>
+                    <a:bodyPr/>
+                    <a:lstStyle/>
+                    <a:p>
+                      <a:pPr algn="ctr"/>
+                      <a:r>
+                        <a:rPr lang="en-TW" dirty="0"/>
+                        <a:t>4.396e-15</a:t>
+                      </a:r>
+                    </a:p>
+                  </a:txBody>
+                  <a:tcPr anchor="ctr"/>
+                </a:tc>
+                <a:tc>
+                  <a:txBody>
+                    <a:bodyPr/>
+                    <a:lstStyle/>
+                    <a:p>
+                      <a:pPr algn="ctr"/>
+                      <a:r>
+                        <a:rPr lang="en-TW" dirty="0"/>
+                        <a:t>5.395e-15</a:t>
+                      </a:r>
+                    </a:p>
+                  </a:txBody>
+                  <a:tcPr anchor="ctr"/>
+                </a:tc>
+                <a:tc>
+                  <a:txBody>
+                    <a:bodyPr/>
+                    <a:lstStyle/>
+                    <a:p>
+                      <a:pPr algn="ctr"/>
+                      <a:r>
+                        <a:rPr lang="en-TW" dirty="0"/>
+                        <a:t>8.929e-15</a:t>
+                      </a:r>
+                    </a:p>
+                  </a:txBody>
+                  <a:tcPr anchor="ctr"/>
+                </a:tc>
+                <a:tc>
+                  <a:txBody>
+                    <a:bodyPr/>
+                    <a:lstStyle/>
+                    <a:p>
+                      <a:pPr algn="ctr"/>
+                      <a:r>
+                        <a:rPr lang="en-TW" dirty="0"/>
+                        <a:t>9.854e-15</a:t>
+                      </a:r>
+                    </a:p>
+                  </a:txBody>
+                  <a:tcPr anchor="ctr"/>
+                </a:tc>
+                <a:tc>
+                  <a:txBody>
+                    <a:bodyPr/>
+                    <a:lstStyle/>
+                    <a:p>
+                      <a:pPr algn="ctr"/>
+                      <a:r>
+                        <a:rPr lang="en-TW" dirty="0"/>
+                        <a:t>9.045e-15</a:t>
+                      </a:r>
+                    </a:p>
+                  </a:txBody>
+                  <a:tcPr anchor="ctr"/>
+                </a:tc>
+                <a:tc>
+                  <a:txBody>
+                    <a:bodyPr/>
+                    <a:lstStyle/>
+                    <a:p>
+                      <a:pPr algn="ctr"/>
+                      <a:r>
+                        <a:rPr lang="en-TW" dirty="0"/>
+                        <a:t>9.422e-15</a:t>
+                      </a:r>
+                    </a:p>
+                  </a:txBody>
+                  <a:tcPr anchor="ctr"/>
+                </a:tc>
+                <a:tc>
+                  <a:txBody>
+                    <a:bodyPr/>
+                    <a:lstStyle/>
+                    <a:p>
+                      <a:pPr algn="ctr"/>
+                      <a:r>
+                        <a:rPr lang="en-TW" dirty="0"/>
+                        <a:t>9.852e-15</a:t>
+                      </a:r>
+                    </a:p>
+                  </a:txBody>
+                  <a:tcPr anchor="ctr"/>
+                </a:tc>
+                <a:extLst>
+                  <a:ext uri="{0D108BD9-81ED-4DB2-BD59-A6C34878D82A}">
+                    <a16:rowId xmlns:a16="http://schemas.microsoft.com/office/drawing/2014/main" val="767737053"/>
+                  </a:ext>
+                </a:extLst>
+              </a:tr>
+            </a:tbl>
+          </a:graphicData>
+        </a:graphic>
+      </p:graphicFrame>
+      <p:pic>
+        <p:nvPicPr>
+          <p:cNvPr id="6" name="Picture 5">
+            <a:extLst>
+              <a:ext uri="{FF2B5EF4-FFF2-40B4-BE49-F238E27FC236}">
+                <a16:creationId xmlns:a16="http://schemas.microsoft.com/office/drawing/2014/main" id="{074FDBFB-7E35-554E-B345-660571AEB34C}"/>
+              </a:ext>
+            </a:extLst>
+          </p:cNvPr>
+          <p:cNvPicPr>
+            <a:picLocks noChangeAspect="1"/>
+          </p:cNvPicPr>
+          <p:nvPr/>
+        </p:nvPicPr>
+        <p:blipFill>
+          <a:blip r:embed="rId2">
+            <a:extLst>
+              <a:ext uri="{28A0092B-C50C-407E-A947-70E740481C1C}">
+                <a14:useLocalDpi xmlns:a14="http://schemas.microsoft.com/office/drawing/2010/main" val="0"/>
+              </a:ext>
+            </a:extLst>
+          </a:blip>
+          <a:stretch>
+            <a:fillRect/>
+          </a:stretch>
+        </p:blipFill>
+        <p:spPr>
+          <a:xfrm>
+            <a:off x="7629782" y="3208226"/>
+            <a:ext cx="4562218" cy="3649774"/>
+          </a:xfrm>
+          <a:prstGeom prst="rect">
+            <a:avLst/>
+          </a:prstGeom>
+        </p:spPr>
+      </p:pic>
+      <p:sp>
+        <p:nvSpPr>
+          <p:cNvPr id="8" name="TextBox 7">
+            <a:extLst>
+              <a:ext uri="{FF2B5EF4-FFF2-40B4-BE49-F238E27FC236}">
+                <a16:creationId xmlns:a16="http://schemas.microsoft.com/office/drawing/2014/main" id="{EBD9DE84-C4BB-D64C-8A37-9129ECA26646}"/>
+              </a:ext>
+            </a:extLst>
+          </p:cNvPr>
+          <p:cNvSpPr txBox="1"/>
+          <p:nvPr/>
+        </p:nvSpPr>
+        <p:spPr>
+          <a:xfrm>
+            <a:off x="5954287" y="6123543"/>
+            <a:ext cx="2314833" cy="369332"/>
+          </a:xfrm>
+          <a:prstGeom prst="rect">
+            <a:avLst/>
+          </a:prstGeom>
+          <a:noFill/>
+        </p:spPr>
+        <p:txBody>
+          <a:bodyPr wrap="square" rtlCol="0">
+            <a:spAutoFit/>
+          </a:bodyPr>
+          <a:lstStyle/>
+          <a:p>
+            <a:r>
+              <a:rPr lang="en-TW" dirty="0"/>
+              <a:t>Boundary Condition</a:t>
+            </a:r>
+          </a:p>
+        </p:txBody>
+      </p:sp>
+      <p:sp>
+        <p:nvSpPr>
+          <p:cNvPr id="10" name="Title 9">
+            <a:extLst>
+              <a:ext uri="{FF2B5EF4-FFF2-40B4-BE49-F238E27FC236}">
+                <a16:creationId xmlns:a16="http://schemas.microsoft.com/office/drawing/2014/main" id="{61805EEC-E1E8-B54B-B676-7396AD3BB456}"/>
+              </a:ext>
+            </a:extLst>
+          </p:cNvPr>
+          <p:cNvSpPr>
+            <a:spLocks noGrp="1"/>
+          </p:cNvSpPr>
+          <p:nvPr>
+            <p:ph type="title"/>
+          </p:nvPr>
+        </p:nvSpPr>
+        <p:spPr/>
+        <p:txBody>
+          <a:bodyPr/>
+          <a:lstStyle/>
+          <a:p>
+            <a:r>
+              <a:rPr lang="en-TW" dirty="0"/>
+              <a:t>Convergence Comparison</a:t>
+            </a:r>
+          </a:p>
+        </p:txBody>
+      </p:sp>
+      <p:sp>
+        <p:nvSpPr>
+          <p:cNvPr id="11" name="TextBox 10">
+            <a:extLst>
+              <a:ext uri="{FF2B5EF4-FFF2-40B4-BE49-F238E27FC236}">
+                <a16:creationId xmlns:a16="http://schemas.microsoft.com/office/drawing/2014/main" id="{72070B8A-1BBF-B24C-B9A0-A647D07B0449}"/>
+              </a:ext>
+            </a:extLst>
+          </p:cNvPr>
+          <p:cNvSpPr txBox="1"/>
+          <p:nvPr/>
+        </p:nvSpPr>
+        <p:spPr>
+          <a:xfrm>
+            <a:off x="1230792" y="3208226"/>
+            <a:ext cx="5362832" cy="646331"/>
+          </a:xfrm>
+          <a:prstGeom prst="rect">
+            <a:avLst/>
+          </a:prstGeom>
+          <a:noFill/>
+        </p:spPr>
+        <p:txBody>
+          <a:bodyPr wrap="square" rtlCol="0">
+            <a:spAutoFit/>
+          </a:bodyPr>
+          <a:lstStyle/>
+          <a:p>
+            <a:r>
+              <a:rPr lang="en-TW" dirty="0"/>
+              <a:t>Machine : Macbook Pro M1 with 4+4 Cores CPU</a:t>
+            </a:r>
+          </a:p>
+          <a:p>
+            <a:r>
+              <a:rPr lang="en-TW" dirty="0"/>
+              <a:t>Domain : 1024 * 1024</a:t>
+            </a:r>
+          </a:p>
+        </p:txBody>
+      </p:sp>
+    </p:spTree>
+    <p:extLst>
+      <p:ext uri="{BB962C8B-B14F-4D97-AF65-F5344CB8AC3E}">
+        <p14:creationId xmlns:p14="http://schemas.microsoft.com/office/powerpoint/2010/main" val="2170499417"/>
       </p:ext>
     </p:extLst>
   </p:cSld>
@@ -3102,7 +4218,7 @@
           <a:p>
             <a:pPr algn="ctr"/>
             <a:r>
-              <a:rPr lang="en-US" altLang="zh-TW" dirty="0" smtClean="0"/>
+              <a:rPr lang="en-US" altLang="zh-TW" dirty="0"/>
               <a:t>Introduction</a:t>
             </a:r>
             <a:endParaRPr lang="zh-TW" altLang="en-US" dirty="0"/>
@@ -3133,13 +4249,12 @@
               </a:p>
               <a:p>
                 <a:r>
-                  <a:rPr lang="en-US" altLang="zh-TW" dirty="0" smtClean="0"/>
+                  <a:rPr lang="en-US" altLang="zh-TW" dirty="0"/>
                   <a:t>CG is the most popular iterative method for solving large systems of linear equations.</a:t>
                 </a:r>
-                <a:endParaRPr lang="en-US" altLang="zh-TW" dirty="0"/>
               </a:p>
               <a:p>
-                <a:endParaRPr lang="en-US" altLang="zh-TW" dirty="0" smtClean="0"/>
+                <a:endParaRPr lang="en-US" altLang="zh-TW" dirty="0"/>
               </a:p>
               <a:p>
                 <a:pPr marL="0" indent="0">
@@ -3180,11 +4295,7 @@
                 </a:pPr>
                 <a:r>
                   <a:rPr lang="en-US" altLang="zh-TW" dirty="0"/>
-                  <a:t>x</a:t>
-                </a:r>
-                <a:r>
-                  <a:rPr lang="en-US" altLang="zh-TW" dirty="0" smtClean="0"/>
-                  <a:t> : unknown vector (what we want to solve)</a:t>
+                  <a:t>x : unknown vector (what we want to solve)</a:t>
                 </a:r>
               </a:p>
               <a:p>
@@ -3192,15 +4303,15 @@
                   <a:buNone/>
                 </a:pPr>
                 <a:r>
-                  <a:rPr lang="en-US" altLang="zh-TW" dirty="0" smtClean="0"/>
+                  <a:rPr lang="en-US" altLang="zh-TW" dirty="0"/>
                   <a:t>b :</a:t>
                 </a:r>
                 <a:r>
-                  <a:rPr lang="zh-TW" altLang="en-US" dirty="0" smtClean="0"/>
+                  <a:rPr lang="zh-TW" altLang="en-US" dirty="0"/>
                   <a:t> </a:t>
                 </a:r>
                 <a:r>
-                  <a:rPr lang="en-US" altLang="zh-TW" dirty="0" smtClean="0"/>
+                  <a:rPr lang="en-US" altLang="zh-TW" dirty="0"/>
                   <a:t>known vector </a:t>
                 </a:r>
               </a:p>
@@ -3209,32 +4320,24 @@
                   <a:buNone/>
                 </a:pPr>
                 <a:r>
-                  <a:rPr lang="en-US" altLang="zh-TW" dirty="0" smtClean="0"/>
+                  <a:rPr lang="en-US" altLang="zh-TW" dirty="0"/>
                   <a:t>A</a:t>
                 </a:r>
                 <a:r>
-                  <a:rPr lang="zh-TW" altLang="en-US" dirty="0" smtClean="0"/>
+                  <a:rPr lang="zh-TW" altLang="en-US" dirty="0"/>
                   <a:t> </a:t>
                 </a:r>
                 <a:r>
-                  <a:rPr lang="en-US" altLang="zh-TW" dirty="0" smtClean="0"/>
+                  <a:rPr lang="en-US" altLang="zh-TW" dirty="0"/>
                   <a:t>:</a:t>
                 </a:r>
                 <a:r>
-                  <a:rPr lang="zh-TW" altLang="en-US" dirty="0" smtClean="0"/>
+                  <a:rPr lang="zh-TW" altLang="en-US" dirty="0"/>
                   <a:t> </a:t>
                 </a:r>
                 <a:r>
-                  <a:rPr lang="en-US" altLang="zh-TW" dirty="0" smtClean="0"/>
-                  <a:t>square</a:t>
-                </a:r>
-                <a:r>
                   <a:rPr lang="en-US" altLang="zh-TW" dirty="0"/>
-                  <a:t>, symmetric, positive-definite </a:t>
-                </a:r>
-                <a:r>
-                  <a:rPr lang="en-US" altLang="zh-TW" dirty="0" smtClean="0"/>
-                  <a:t>matrix .</a:t>
+                  <a:t>square, symmetric, positive-definite matrix .</a:t>
                 </a:r>
                 <a:endParaRPr lang="zh-TW" altLang="en-US" dirty="0"/>
               </a:p>
@@ -3285,13 +4388,6 @@
   <p:clrMapOvr>
     <a:masterClrMapping/>
   </p:clrMapOvr>
-  <p:timing>
-    <p:tnLst>
-      <p:par>
-        <p:cTn id="1" dur="indefinite" restart="never" nodeType="tmRoot"/>
-      </p:par>
-    </p:tnLst>
-  </p:timing>
 </p:sld>
 </file>
 
@@ -3329,7 +4425,7 @@
           <a:p>
             <a:pPr algn="ctr"/>
             <a:r>
-              <a:rPr lang="en-US" altLang="zh-TW" dirty="0" smtClean="0"/>
+              <a:rPr lang="en-US" altLang="zh-TW" dirty="0"/>
               <a:t>Quadratic form</a:t>
             </a:r>
             <a:endParaRPr lang="zh-TW" altLang="en-US" dirty="0"/>
@@ -3362,13 +4458,13 @@
                   <a:buNone/>
                 </a:pPr>
                 <a:r>
-                  <a:rPr lang="en-US" altLang="zh-TW" b="0" dirty="0" smtClean="0">
+                  <a:rPr lang="en-US" altLang="zh-TW" b="0" dirty="0">
                     <a:latin typeface="Cambria Math" panose="02040503050406030204" pitchFamily="18" charset="0"/>
                   </a:rPr>
                   <a:t>Minimizing</a:t>
                 </a:r>
                 <a:r>
-                  <a:rPr lang="en-US" altLang="zh-TW" b="0" i="1" dirty="0" smtClean="0">
+                  <a:rPr lang="en-US" altLang="zh-TW" b="0" i="1" dirty="0">
                     <a:latin typeface="Cambria Math" panose="02040503050406030204" pitchFamily="18" charset="0"/>
                   </a:rPr>
                   <a:t> </a:t>
@@ -3521,7 +4617,7 @@
                     </m:oMath>
                   </m:oMathPara>
                 </a14:m>
-                <a:endParaRPr lang="en-US" altLang="zh-TW" b="0" i="1" dirty="0" smtClean="0">
+                <a:endParaRPr lang="en-US" altLang="zh-TW" b="0" i="1" dirty="0">
                   <a:latin typeface="Cambria Math" panose="02040503050406030204" pitchFamily="18" charset="0"/>
                 </a:endParaRPr>
               </a:p>
@@ -3530,7 +4626,7 @@
                   <a:buNone/>
                 </a:pPr>
                 <a:r>
-                  <a:rPr lang="en-US" altLang="zh-TW" b="0" i="0" dirty="0" smtClean="0">
+                  <a:rPr lang="en-US" altLang="zh-TW" b="0" i="0" dirty="0">
                     <a:latin typeface="Cambria Math" panose="02040503050406030204" pitchFamily="18" charset="0"/>
                   </a:rPr>
                   <a:t>Is equivalent to solving </a:t>
@@ -3574,7 +4670,7 @@
                   <a:buNone/>
                 </a:pPr>
                 <a:r>
-                  <a:rPr lang="en-US" altLang="zh-TW" dirty="0" smtClean="0"/>
+                  <a:rPr lang="en-US" altLang="zh-TW" dirty="0"/>
                   <a:t>Since </a:t>
                 </a:r>
               </a:p>
@@ -3657,7 +4753,7 @@
                     </m:oMath>
                   </m:oMathPara>
                 </a14:m>
-                <a:endParaRPr lang="en-US" altLang="zh-TW" dirty="0" smtClean="0"/>
+                <a:endParaRPr lang="en-US" altLang="zh-TW" dirty="0"/>
               </a:p>
             </p:txBody>
           </p:sp>
@@ -3754,15 +4850,15 @@
           <a:p>
             <a:pPr algn="r"/>
             <a:r>
-              <a:rPr lang="en-US" altLang="zh-TW" sz="1000" dirty="0" smtClean="0"/>
+              <a:rPr lang="en-US" altLang="zh-TW" sz="1000" dirty="0"/>
               <a:t>Source : Jonathan Richard </a:t>
             </a:r>
             <a:r>
-              <a:rPr lang="en-US" altLang="zh-TW" sz="1000" dirty="0" err="1" smtClean="0"/>
+              <a:rPr lang="en-US" altLang="zh-TW" sz="1000" dirty="0" err="1"/>
               <a:t>Shewchuk</a:t>
             </a:r>
             <a:r>
-              <a:rPr lang="en-US" altLang="zh-TW" sz="1000" dirty="0" smtClean="0"/>
+              <a:rPr lang="en-US" altLang="zh-TW" sz="1000" dirty="0"/>
               <a:t> 1994 - An Introduction to the Conjugate Gradient Method Without the Agonizing Pain</a:t>
             </a:r>
             <a:endParaRPr lang="zh-TW" altLang="en-US" sz="1000" dirty="0"/>
@@ -3779,13 +4875,6 @@
   <p:clrMapOvr>
     <a:masterClrMapping/>
   </p:clrMapOvr>
-  <p:timing>
-    <p:tnLst>
-      <p:par>
-        <p:cTn id="1" dur="indefinite" restart="never" nodeType="tmRoot"/>
-      </p:par>
-    </p:tnLst>
-  </p:timing>
 </p:sld>
 </file>
 
@@ -3889,15 +4978,15 @@
           <a:lstStyle/>
           <a:p>
             <a:r>
-              <a:rPr lang="en-US" altLang="zh-TW" sz="1000" dirty="0" smtClean="0"/>
+              <a:rPr lang="en-US" altLang="zh-TW" sz="1000" dirty="0"/>
               <a:t>Source : Jonathan Richard </a:t>
             </a:r>
             <a:r>
-              <a:rPr lang="en-US" altLang="zh-TW" sz="1000" dirty="0" err="1" smtClean="0"/>
+              <a:rPr lang="en-US" altLang="zh-TW" sz="1000" dirty="0" err="1"/>
               <a:t>Shewchuk</a:t>
             </a:r>
             <a:r>
-              <a:rPr lang="en-US" altLang="zh-TW" sz="1000" dirty="0" smtClean="0"/>
+              <a:rPr lang="en-US" altLang="zh-TW" sz="1000" dirty="0"/>
               <a:t> 1994 - An Introduction to the Conjugate Gradient Method Without the Agonizing Pain</a:t>
             </a:r>
             <a:endParaRPr lang="zh-TW" altLang="en-US" sz="1000" dirty="0"/>
@@ -4035,7 +5124,7 @@
           <a:lstStyle/>
           <a:p>
             <a:r>
-              <a:rPr lang="en-US" altLang="zh-TW" sz="3200" dirty="0" smtClean="0"/>
+              <a:rPr lang="en-US" altLang="zh-TW" sz="3200" dirty="0"/>
               <a:t>Method of Steepest Descent</a:t>
             </a:r>
             <a:endParaRPr lang="zh-TW" altLang="en-US" sz="3200" dirty="0"/>
@@ -4067,7 +5156,7 @@
               <a:lstStyle/>
               <a:p>
                 <a:r>
-                  <a:rPr lang="en-US" altLang="zh-TW" sz="2000" dirty="0" smtClean="0"/>
+                  <a:rPr lang="en-US" altLang="zh-TW" sz="2000" dirty="0"/>
                   <a:t>Residual  </a:t>
                 </a:r>
                 <a14:m>
@@ -4187,14 +5276,14 @@
                 <a:endParaRPr lang="zh-TW" altLang="en-US" sz="2000" dirty="0"/>
               </a:p>
               <a:p>
-                <a:endParaRPr lang="en-US" altLang="zh-TW" sz="2000" dirty="0" smtClean="0"/>
+                <a:endParaRPr lang="en-US" altLang="zh-TW" sz="2000" dirty="0"/>
               </a:p>
               <a:p>
                 <a:endParaRPr lang="en-US" altLang="zh-TW" sz="2000" dirty="0"/>
               </a:p>
               <a:p>
                 <a:r>
-                  <a:rPr lang="en-US" altLang="zh-TW" sz="2000" dirty="0" smtClean="0">
+                  <a:rPr lang="en-US" altLang="zh-TW" sz="2000" dirty="0">
                     <a:latin typeface="Cambria Math" panose="02040503050406030204" pitchFamily="18" charset="0"/>
                   </a:rPr>
                   <a:t>Take step along  </a:t>
@@ -4239,14 +5328,14 @@
                   </m:oMath>
                 </a14:m>
                 <a:r>
-                  <a:rPr lang="en-US" altLang="zh-TW" sz="2000" i="1" dirty="0" smtClean="0">
+                  <a:rPr lang="en-US" altLang="zh-TW" sz="2000" i="1" dirty="0">
                     <a:latin typeface="Cambria Math" panose="02040503050406030204" pitchFamily="18" charset="0"/>
                   </a:rPr>
                   <a:t>  </a:t>
                 </a:r>
               </a:p>
               <a:p>
-                <a:endParaRPr lang="en-US" altLang="zh-TW" sz="2000" i="1" dirty="0" smtClean="0">
+                <a:endParaRPr lang="en-US" altLang="zh-TW" sz="2000" i="1" dirty="0">
                   <a:latin typeface="Cambria Math" panose="02040503050406030204" pitchFamily="18" charset="0"/>
                 </a:endParaRPr>
               </a:p>
@@ -4362,7 +5451,7 @@
                     </m:oMath>
                   </m:oMathPara>
                 </a14:m>
-                <a:endParaRPr lang="en-US" altLang="zh-TW" sz="2000" i="1" dirty="0" smtClean="0">
+                <a:endParaRPr lang="en-US" altLang="zh-TW" sz="2000" i="1" dirty="0">
                   <a:latin typeface="Cambria Math" panose="02040503050406030204" pitchFamily="18" charset="0"/>
                 </a:endParaRPr>
               </a:p>
@@ -4376,7 +5465,7 @@
               </a:p>
               <a:p>
                 <a:r>
-                  <a:rPr lang="en-US" altLang="zh-TW" sz="2000" dirty="0" smtClean="0">
+                  <a:rPr lang="en-US" altLang="zh-TW" sz="2000" dirty="0">
                     <a:latin typeface="Cambria Math" panose="02040503050406030204" pitchFamily="18" charset="0"/>
                   </a:rPr>
                   <a:t>Minimize </a:t>
@@ -4409,20 +5498,20 @@
                   </m:oMath>
                 </a14:m>
                 <a:r>
-                  <a:rPr lang="en-US" altLang="zh-TW" sz="2000" i="1" dirty="0" smtClean="0">
+                  <a:rPr lang="en-US" altLang="zh-TW" sz="2000" i="1" dirty="0">
                     <a:latin typeface="Cambria Math" panose="02040503050406030204" pitchFamily="18" charset="0"/>
                   </a:rPr>
                   <a:t> </a:t>
                 </a:r>
                 <a:r>
-                  <a:rPr lang="en-US" altLang="zh-TW" sz="2000" dirty="0" smtClean="0">
+                  <a:rPr lang="en-US" altLang="zh-TW" sz="2000" dirty="0">
                     <a:latin typeface="Cambria Math" panose="02040503050406030204" pitchFamily="18" charset="0"/>
                   </a:rPr>
                   <a:t>with a line search</a:t>
                 </a:r>
               </a:p>
               <a:p>
-                <a:endParaRPr lang="en-US" altLang="zh-TW" sz="2000" dirty="0" smtClean="0">
+                <a:endParaRPr lang="en-US" altLang="zh-TW" sz="2000" dirty="0">
                   <a:latin typeface="Cambria Math" panose="02040503050406030204" pitchFamily="18" charset="0"/>
                 </a:endParaRPr>
               </a:p>
@@ -4605,13 +5694,13 @@
                     </m:oMath>
                   </m:oMathPara>
                 </a14:m>
-                <a:endParaRPr lang="en-US" altLang="zh-TW" sz="2000" dirty="0" smtClean="0"/>
+                <a:endParaRPr lang="en-US" altLang="zh-TW" sz="2000" dirty="0"/>
               </a:p>
               <a:p>
                 <a:pPr marL="0" indent="0">
                   <a:buNone/>
                 </a:pPr>
-                <a:endParaRPr lang="en-US" altLang="zh-TW" sz="2000" dirty="0" smtClean="0"/>
+                <a:endParaRPr lang="en-US" altLang="zh-TW" sz="2000" dirty="0"/>
               </a:p>
               <a:p>
                 <a:endParaRPr lang="en-US" altLang="zh-TW" sz="2000" dirty="0"/>
@@ -4711,13 +5800,6 @@
   <p:clrMapOvr>
     <a:masterClrMapping/>
   </p:clrMapOvr>
-  <p:timing>
-    <p:tnLst>
-      <p:par>
-        <p:cTn id="1" dur="indefinite" restart="never" nodeType="tmRoot"/>
-      </p:par>
-    </p:tnLst>
-  </p:timing>
 </p:sld>
 </file>
 
@@ -4755,7 +5837,7 @@
           <a:p>
             <a:pPr algn="ctr"/>
             <a:r>
-              <a:rPr lang="en-US" altLang="zh-TW" dirty="0" smtClean="0"/>
+              <a:rPr lang="en-US" altLang="zh-TW" dirty="0"/>
               <a:t>Can we do better?</a:t>
             </a:r>
             <a:endParaRPr lang="zh-TW" altLang="en-US" dirty="0"/>
@@ -4815,15 +5897,15 @@
           <a:lstStyle/>
           <a:p>
             <a:r>
-              <a:rPr lang="en-US" altLang="zh-TW" sz="1000" dirty="0" smtClean="0"/>
+              <a:rPr lang="en-US" altLang="zh-TW" sz="1000" dirty="0"/>
               <a:t>Source : Jonathan Richard </a:t>
             </a:r>
             <a:r>
-              <a:rPr lang="en-US" altLang="zh-TW" sz="1000" dirty="0" err="1" smtClean="0"/>
+              <a:rPr lang="en-US" altLang="zh-TW" sz="1000" dirty="0" err="1"/>
               <a:t>Shewchuk</a:t>
             </a:r>
             <a:r>
-              <a:rPr lang="en-US" altLang="zh-TW" sz="1000" dirty="0" smtClean="0"/>
+              <a:rPr lang="en-US" altLang="zh-TW" sz="1000" dirty="0"/>
               <a:t> 1994 - An Introduction to the Conjugate Gradient Method Without the Agonizing Pain</a:t>
             </a:r>
             <a:endParaRPr lang="zh-TW" altLang="en-US" sz="1000" dirty="0"/>
@@ -4878,11 +5960,7 @@
             <a:pPr algn="ctr"/>
             <a:r>
               <a:rPr lang="en-US" altLang="zh-TW" dirty="0"/>
-              <a:t>The Method of Conjugate </a:t>
-            </a:r>
-            <a:r>
-              <a:rPr lang="en-US" altLang="zh-TW" dirty="0" smtClean="0"/>
-              <a:t>Directions</a:t>
+              <a:t>The Method of Conjugate Directions</a:t>
             </a:r>
             <a:endParaRPr lang="zh-TW" altLang="en-US" dirty="0"/>
           </a:p>
@@ -4911,31 +5989,14 @@
               <a:lstStyle/>
               <a:p>
                 <a:r>
-                  <a:rPr lang="en-US" altLang="zh-TW" dirty="0" smtClean="0"/>
+                  <a:rPr lang="en-US" altLang="zh-TW" dirty="0"/>
                   <a:t>We want to take only one perfect step along every orthogonal search direction .</a:t>
                 </a:r>
-                <a:endParaRPr lang="en-US" altLang="zh-TW" dirty="0"/>
               </a:p>
               <a:p>
                 <a:r>
-                  <a:rPr lang="en-US" altLang="zh-TW" dirty="0" smtClean="0"/>
-                  <a:t>The </a:t>
-                </a:r>
-                <a:r>
                   <a:rPr lang="en-US" altLang="zh-TW" dirty="0"/>
-                  <a:t>solution is to make the search </a:t>
-                </a:r>
-                <a:r>
-                  <a:rPr lang="en-US" altLang="zh-TW" dirty="0" smtClean="0"/>
-                  <a:t>directions A-orthogonal (</a:t>
-                </a:r>
-                <a:r>
-                  <a:rPr lang="en-US" altLang="zh-TW" dirty="0"/>
-                  <a:t>conjugate</a:t>
-                </a:r>
-                <a:r>
-                  <a:rPr lang="en-US" altLang="zh-TW" dirty="0" smtClean="0"/>
-                  <a:t>)</a:t>
+                  <a:t>The solution is to make the search directions A-orthogonal (conjugate)</a:t>
                 </a:r>
               </a:p>
               <a:p>
@@ -4943,16 +6004,8 @@
                   <a:buNone/>
                 </a:pPr>
                 <a:r>
-                  <a:rPr lang="en-US" altLang="zh-TW" dirty="0" smtClean="0"/>
-                  <a:t>   </a:t>
-                </a:r>
-                <a:r>
                   <a:rPr lang="en-US" altLang="zh-TW" dirty="0"/>
-                  <a:t>instead of orthogonal</a:t>
-                </a:r>
-                <a:r>
-                  <a:rPr lang="en-US" altLang="zh-TW" dirty="0" smtClean="0"/>
-                  <a:t>.</a:t>
+                  <a:t>   instead of orthogonal.</a:t>
                 </a:r>
               </a:p>
               <a:p>
@@ -5034,7 +6087,7 @@
                   </m:oMath>
                 </a14:m>
                 <a:r>
-                  <a:rPr lang="en-US" altLang="zh-TW" dirty="0" smtClean="0"/>
+                  <a:rPr lang="en-US" altLang="zh-TW" dirty="0"/>
                   <a:t>   for </a:t>
                 </a:r>
                 <a14:m>
@@ -5065,7 +6118,7 @@
                     </m:r>
                   </m:oMath>
                 </a14:m>
-                <a:endParaRPr lang="en-US" altLang="zh-TW" dirty="0" smtClean="0"/>
+                <a:endParaRPr lang="en-US" altLang="zh-TW" dirty="0"/>
               </a:p>
             </p:txBody>
           </p:sp>
@@ -5191,7 +6244,7 @@
           <a:lstStyle/>
           <a:p>
             <a:r>
-              <a:rPr lang="en-US" altLang="zh-TW" dirty="0" smtClean="0"/>
+              <a:rPr lang="en-US" altLang="zh-TW" dirty="0"/>
               <a:t>A-orthogonal directions</a:t>
             </a:r>
           </a:p>
@@ -5464,15 +6517,15 @@
           <a:lstStyle/>
           <a:p>
             <a:r>
-              <a:rPr lang="en-US" altLang="zh-TW" sz="1000" dirty="0" smtClean="0"/>
+              <a:rPr lang="en-US" altLang="zh-TW" sz="1000" dirty="0"/>
               <a:t>Source : Jonathan Richard </a:t>
             </a:r>
             <a:r>
-              <a:rPr lang="en-US" altLang="zh-TW" sz="1000" dirty="0" err="1" smtClean="0"/>
+              <a:rPr lang="en-US" altLang="zh-TW" sz="1000" dirty="0" err="1"/>
               <a:t>Shewchuk</a:t>
             </a:r>
             <a:r>
-              <a:rPr lang="en-US" altLang="zh-TW" sz="1000" dirty="0" smtClean="0"/>
+              <a:rPr lang="en-US" altLang="zh-TW" sz="1000" dirty="0"/>
               <a:t> 1994 - An Introduction to the Conjugate Gradient Method Without the Agonizing Pain</a:t>
             </a:r>
             <a:endParaRPr lang="zh-TW" altLang="en-US" sz="1000" dirty="0"/>
@@ -5489,13 +6542,6 @@
   <p:clrMapOvr>
     <a:masterClrMapping/>
   </p:clrMapOvr>
-  <p:timing>
-    <p:tnLst>
-      <p:par>
-        <p:cTn id="1" dur="indefinite" restart="never" nodeType="tmRoot"/>
-      </p:par>
-    </p:tnLst>
-  </p:timing>
 </p:sld>
 </file>
 
@@ -5533,12 +6579,8 @@
           <a:p>
             <a:pPr algn="ctr"/>
             <a:r>
-              <a:rPr lang="en-US" altLang="zh-TW" dirty="0" smtClean="0"/>
-              <a:t>Find a </a:t>
-            </a:r>
-            <a:r>
               <a:rPr lang="en-US" altLang="zh-TW" dirty="0"/>
-              <a:t>set of -orthogonal search directions</a:t>
+              <a:t>Find a set of -orthogonal search directions</a:t>
             </a:r>
             <a:endParaRPr lang="zh-TW" altLang="en-US" dirty="0"/>
           </a:p>
@@ -5672,15 +6714,15 @@
           <a:lstStyle/>
           <a:p>
             <a:r>
-              <a:rPr lang="en-US" altLang="zh-TW" sz="1000" dirty="0" smtClean="0"/>
+              <a:rPr lang="en-US" altLang="zh-TW" sz="1000" dirty="0"/>
               <a:t>Source : Jonathan Richard </a:t>
             </a:r>
             <a:r>
-              <a:rPr lang="en-US" altLang="zh-TW" sz="1000" dirty="0" err="1" smtClean="0"/>
+              <a:rPr lang="en-US" altLang="zh-TW" sz="1000" dirty="0" err="1"/>
               <a:t>Shewchuk</a:t>
             </a:r>
             <a:r>
-              <a:rPr lang="en-US" altLang="zh-TW" sz="1000" dirty="0" smtClean="0"/>
+              <a:rPr lang="en-US" altLang="zh-TW" sz="1000" dirty="0"/>
               <a:t> 1994 - An Introduction to the Conjugate Gradient Method Without the Agonizing Pain</a:t>
             </a:r>
             <a:endParaRPr lang="zh-TW" altLang="en-US" sz="1000" dirty="0"/>
@@ -5697,13 +6739,6 @@
   <p:clrMapOvr>
     <a:masterClrMapping/>
   </p:clrMapOvr>
-  <p:timing>
-    <p:tnLst>
-      <p:par>
-        <p:cTn id="1" dur="indefinite" restart="never" nodeType="tmRoot"/>
-      </p:par>
-    </p:tnLst>
-  </p:timing>
 </p:sld>
 </file>
 
@@ -5748,8 +6783,8 @@
           </a:p>
         </p:txBody>
       </p:sp>
-      <mc:AlternateContent xmlns:mc="http://schemas.openxmlformats.org/markup-compatibility/2006">
-        <mc:Choice xmlns:a14="http://schemas.microsoft.com/office/drawing/2010/main" Requires="a14">
+      <mc:AlternateContent xmlns:mc="http://schemas.openxmlformats.org/markup-compatibility/2006" xmlns:a14="http://schemas.microsoft.com/office/drawing/2010/main">
+        <mc:Choice Requires="a14">
           <p:sp>
             <p:nvSpPr>
               <p:cNvPr id="8" name="文字方塊 7"/>
@@ -5773,7 +6808,7 @@
               <a:lstStyle/>
               <a:p>
                 <a:r>
-                  <a:rPr lang="en-US" altLang="zh-TW" sz="2000" dirty="0" smtClean="0"/>
+                  <a:rPr lang="en-US" altLang="zh-TW" sz="2000" dirty="0"/>
                   <a:t>1. </a:t>
                 </a:r>
                 <a14:m>
@@ -5885,23 +6920,15 @@
                     </m:sSub>
                   </m:oMath>
                 </a14:m>
-                <a:endParaRPr lang="en-US" altLang="zh-TW" sz="2000" dirty="0" smtClean="0"/>
+                <a:endParaRPr lang="en-US" altLang="zh-TW" sz="2000" dirty="0"/>
               </a:p>
               <a:p>
-                <a:endParaRPr lang="en-US" altLang="zh-TW" sz="2000" dirty="0" smtClean="0"/>
+                <a:endParaRPr lang="en-US" altLang="zh-TW" sz="2000" dirty="0"/>
               </a:p>
               <a:p>
                 <a:r>
-                  <a:rPr lang="en-US" altLang="zh-TW" sz="2000" dirty="0" smtClean="0"/>
-                  <a:t>2.</a:t>
-                </a:r>
-                <a:r>
                   <a:rPr lang="en-US" altLang="zh-TW" sz="2000" dirty="0"/>
-                  <a:t> </a:t>
-                </a:r>
-                <a:r>
-                  <a:rPr lang="en-US" altLang="zh-TW" sz="2000" dirty="0" smtClean="0"/>
-                  <a:t> </a:t>
+                  <a:t>2.  </a:t>
                 </a:r>
                 <a14:m>
                   <m:oMath xmlns:m="http://schemas.openxmlformats.org/officeDocument/2006/math">
@@ -6073,23 +7100,15 @@
                     </m:f>
                   </m:oMath>
                 </a14:m>
-                <a:endParaRPr lang="en-US" altLang="zh-TW" sz="2000" dirty="0" smtClean="0"/>
+                <a:endParaRPr lang="en-US" altLang="zh-TW" sz="2000" dirty="0"/>
               </a:p>
               <a:p>
-                <a:endParaRPr lang="en-US" altLang="zh-TW" sz="2000" dirty="0" smtClean="0"/>
+                <a:endParaRPr lang="en-US" altLang="zh-TW" sz="2000" dirty="0"/>
               </a:p>
               <a:p>
                 <a:r>
-                  <a:rPr lang="en-US" altLang="zh-TW" sz="2000" dirty="0" smtClean="0"/>
-                  <a:t>3.</a:t>
-                </a:r>
-                <a:r>
                   <a:rPr lang="en-US" altLang="zh-TW" sz="2000" dirty="0"/>
-                  <a:t> </a:t>
-                </a:r>
-                <a:r>
-                  <a:rPr lang="en-US" altLang="zh-TW" sz="2000" dirty="0" smtClean="0"/>
-                  <a:t> </a:t>
+                  <a:t>3.  </a:t>
                 </a:r>
                 <a14:m>
                   <m:oMath xmlns:m="http://schemas.openxmlformats.org/officeDocument/2006/math">
@@ -6213,23 +7232,15 @@
                     </m:sSub>
                   </m:oMath>
                 </a14:m>
-                <a:endParaRPr lang="en-US" altLang="zh-TW" sz="2000" dirty="0" smtClean="0"/>
+                <a:endParaRPr lang="en-US" altLang="zh-TW" sz="2000" dirty="0"/>
               </a:p>
               <a:p>
-                <a:endParaRPr lang="en-US" altLang="zh-TW" sz="2000" dirty="0" smtClean="0"/>
+                <a:endParaRPr lang="en-US" altLang="zh-TW" sz="2000" dirty="0"/>
               </a:p>
               <a:p>
                 <a:r>
-                  <a:rPr lang="en-US" altLang="zh-TW" sz="2000" dirty="0" smtClean="0"/>
-                  <a:t>4.</a:t>
-                </a:r>
-                <a:r>
                   <a:rPr lang="en-US" altLang="zh-TW" sz="2000" dirty="0"/>
-                  <a:t> </a:t>
-                </a:r>
-                <a:r>
-                  <a:rPr lang="en-US" altLang="zh-TW" sz="2000" dirty="0" smtClean="0"/>
-                  <a:t> </a:t>
+                  <a:t>4.  </a:t>
                 </a:r>
                 <a14:m>
                   <m:oMath xmlns:m="http://schemas.openxmlformats.org/officeDocument/2006/math">
@@ -6414,23 +7425,15 @@
                     </m:sSub>
                   </m:oMath>
                 </a14:m>
-                <a:endParaRPr lang="en-US" altLang="zh-TW" sz="2000" dirty="0" smtClean="0"/>
+                <a:endParaRPr lang="en-US" altLang="zh-TW" sz="2000" dirty="0"/>
               </a:p>
               <a:p>
-                <a:endParaRPr lang="en-US" altLang="zh-TW" sz="2000" dirty="0" smtClean="0"/>
+                <a:endParaRPr lang="en-US" altLang="zh-TW" sz="2000" dirty="0"/>
               </a:p>
               <a:p>
                 <a:r>
-                  <a:rPr lang="en-US" altLang="zh-TW" sz="2000" dirty="0" smtClean="0"/>
-                  <a:t>5.</a:t>
-                </a:r>
-                <a:r>
                   <a:rPr lang="en-US" altLang="zh-TW" sz="2000" dirty="0"/>
-                  <a:t> </a:t>
-                </a:r>
-                <a:r>
-                  <a:rPr lang="en-US" altLang="zh-TW" sz="2000" dirty="0" smtClean="0"/>
-                  <a:t> </a:t>
+                  <a:t>5.  </a:t>
                 </a:r>
                 <a14:m>
                   <m:oMath xmlns:m="http://schemas.openxmlformats.org/officeDocument/2006/math">
@@ -6614,23 +7617,15 @@
                     </m:f>
                   </m:oMath>
                 </a14:m>
-                <a:endParaRPr lang="en-US" altLang="zh-TW" sz="2000" dirty="0" smtClean="0"/>
+                <a:endParaRPr lang="en-US" altLang="zh-TW" sz="2000" dirty="0"/>
               </a:p>
               <a:p>
-                <a:endParaRPr lang="en-US" altLang="zh-TW" sz="2000" dirty="0" smtClean="0"/>
+                <a:endParaRPr lang="en-US" altLang="zh-TW" sz="2000" dirty="0"/>
               </a:p>
               <a:p>
                 <a:r>
-                  <a:rPr lang="en-US" altLang="zh-TW" sz="2000" dirty="0" smtClean="0"/>
-                  <a:t>6.</a:t>
-                </a:r>
-                <a:r>
                   <a:rPr lang="en-US" altLang="zh-TW" sz="2000" dirty="0"/>
-                  <a:t> </a:t>
-                </a:r>
-                <a:r>
-                  <a:rPr lang="en-US" altLang="zh-TW" sz="2000" dirty="0" smtClean="0"/>
-                  <a:t> </a:t>
+                  <a:t>6.  </a:t>
                 </a:r>
                 <a14:m>
                   <m:oMath xmlns:m="http://schemas.openxmlformats.org/officeDocument/2006/math">
@@ -6766,15 +7761,15 @@
                     </m:sSub>
                   </m:oMath>
                 </a14:m>
-                <a:endParaRPr lang="en-US" altLang="zh-TW" sz="2000" dirty="0" smtClean="0"/>
+                <a:endParaRPr lang="en-US" altLang="zh-TW" sz="2000" dirty="0"/>
               </a:p>
               <a:p>
-                <a:endParaRPr lang="en-US" altLang="zh-TW" sz="2000" dirty="0" smtClean="0"/>
+                <a:endParaRPr lang="en-US" altLang="zh-TW" sz="2000" dirty="0"/>
               </a:p>
             </p:txBody>
           </p:sp>
         </mc:Choice>
-        <mc:Fallback>
+        <mc:Fallback xmlns="">
           <p:sp>
             <p:nvSpPr>
               <p:cNvPr id="8" name="文字方塊 7"/>
@@ -6836,16 +7831,8 @@
           <a:lstStyle/>
           <a:p>
             <a:r>
-              <a:rPr lang="en-US" altLang="zh-TW" sz="2400" dirty="0" smtClean="0"/>
-              <a:t>For N*N </a:t>
-            </a:r>
-            <a:r>
               <a:rPr lang="en-US" altLang="zh-TW" sz="2400" dirty="0"/>
-              <a:t>P</a:t>
-            </a:r>
-            <a:r>
-              <a:rPr lang="en-US" altLang="zh-TW" sz="2400" dirty="0" smtClean="0"/>
-              <a:t>oisson problem </a:t>
+              <a:t>For N*N Poisson problem </a:t>
             </a:r>
             <a:endParaRPr lang="zh-TW" altLang="en-US" sz="2400" dirty="0"/>
           </a:p>
@@ -6865,8 +7852,8 @@
             <a:chExt cx="2857446" cy="400110"/>
           </a:xfrm>
         </p:grpSpPr>
-        <mc:AlternateContent xmlns:mc="http://schemas.openxmlformats.org/markup-compatibility/2006">
-          <mc:Choice xmlns:a14="http://schemas.microsoft.com/office/drawing/2010/main" Requires="a14">
+        <mc:AlternateContent xmlns:mc="http://schemas.openxmlformats.org/markup-compatibility/2006" xmlns:a14="http://schemas.microsoft.com/office/drawing/2010/main">
+          <mc:Choice Requires="a14">
             <p:sp>
               <p:nvSpPr>
                 <p:cNvPr id="12" name="文字方塊 11"/>
@@ -6905,7 +7892,7 @@
                               <a:latin typeface="Cambria Math" panose="02040503050406030204" pitchFamily="18" charset="0"/>
                               <a:ea typeface="Cambria Math" panose="02040503050406030204" pitchFamily="18" charset="0"/>
                             </a:rPr>
-                            <m:t>∇</m:t>
+                            <m:t>𝛻</m:t>
                           </m:r>
                         </m:e>
                         <m:sup>
@@ -6941,11 +7928,11 @@
                     </m:oMath>
                   </a14:m>
                   <a:r>
-                    <a:rPr lang="zh-TW" altLang="en-US" sz="2000" dirty="0" smtClean="0"/>
+                    <a:rPr lang="zh-TW" altLang="en-US" sz="2000" dirty="0"/>
                     <a:t>      </a:t>
                   </a:r>
                   <a:r>
-                    <a:rPr lang="en-US" altLang="zh-TW" sz="2000" dirty="0" smtClean="0">
+                    <a:rPr lang="en-US" altLang="zh-TW" sz="2000" dirty="0">
                       <a:sym typeface="Wingdings" panose="05000000000000000000" pitchFamily="2" charset="2"/>
                     </a:rPr>
                     <a:t></a:t>
@@ -6955,7 +7942,7 @@
               </p:txBody>
             </p:sp>
           </mc:Choice>
-          <mc:Fallback>
+          <mc:Fallback xmlns="">
             <p:sp>
               <p:nvSpPr>
                 <p:cNvPr id="12" name="文字方塊 11"/>
@@ -6994,8 +7981,8 @@
             </p:sp>
           </mc:Fallback>
         </mc:AlternateContent>
-        <mc:AlternateContent xmlns:mc="http://schemas.openxmlformats.org/markup-compatibility/2006">
-          <mc:Choice xmlns:a14="http://schemas.microsoft.com/office/drawing/2010/main" Requires="a14">
+        <mc:AlternateContent xmlns:mc="http://schemas.openxmlformats.org/markup-compatibility/2006" xmlns:a14="http://schemas.microsoft.com/office/drawing/2010/main">
+          <mc:Choice Requires="a14">
             <p:sp>
               <p:nvSpPr>
                 <p:cNvPr id="13" name="矩形 12"/>
@@ -7017,6 +8004,7 @@
                 </a:bodyPr>
                 <a:lstStyle/>
                 <a:p>
+                  <a:pPr/>
                   <a14:m>
                     <m:oMathPara xmlns:m="http://schemas.openxmlformats.org/officeDocument/2006/math">
                       <m:oMathParaPr>
@@ -7049,7 +8037,7 @@
               </p:txBody>
             </p:sp>
           </mc:Choice>
-          <mc:Fallback>
+          <mc:Fallback xmlns="">
             <p:sp>
               <p:nvSpPr>
                 <p:cNvPr id="13" name="矩形 12"/>
@@ -7089,8 +8077,8 @@
           </mc:Fallback>
         </mc:AlternateContent>
       </p:grpSp>
-      <mc:AlternateContent xmlns:mc="http://schemas.openxmlformats.org/markup-compatibility/2006">
-        <mc:Choice xmlns:a14="http://schemas.microsoft.com/office/drawing/2010/main" Requires="a14">
+      <mc:AlternateContent xmlns:mc="http://schemas.openxmlformats.org/markup-compatibility/2006" xmlns:a14="http://schemas.microsoft.com/office/drawing/2010/main">
+        <mc:Choice Requires="a14">
           <p:sp>
             <p:nvSpPr>
               <p:cNvPr id="14" name="文字方塊 13"/>
@@ -7113,6 +8101,7 @@
               </a:bodyPr>
               <a:lstStyle/>
               <a:p>
+                <a:pPr/>
                 <a14:m>
                   <m:oMathPara xmlns:m="http://schemas.openxmlformats.org/officeDocument/2006/math">
                     <m:oMathParaPr>
@@ -7430,7 +8419,7 @@
             </p:txBody>
           </p:sp>
         </mc:Choice>
-        <mc:Fallback>
+        <mc:Fallback xmlns="">
           <p:sp>
             <p:nvSpPr>
               <p:cNvPr id="14" name="文字方塊 13"/>
@@ -7483,8 +8472,8 @@
             <a:chExt cx="3925330" cy="1649554"/>
           </a:xfrm>
         </p:grpSpPr>
-        <mc:AlternateContent xmlns:mc="http://schemas.openxmlformats.org/markup-compatibility/2006">
-          <mc:Choice xmlns:a14="http://schemas.microsoft.com/office/drawing/2010/main" Requires="a14">
+        <mc:AlternateContent xmlns:mc="http://schemas.openxmlformats.org/markup-compatibility/2006" xmlns:a14="http://schemas.microsoft.com/office/drawing/2010/main">
+          <mc:Choice Requires="a14">
             <p:sp>
               <p:nvSpPr>
                 <p:cNvPr id="9" name="文字方塊 8"/>
@@ -7706,7 +8695,7 @@
               </p:txBody>
             </p:sp>
           </mc:Choice>
-          <mc:Fallback>
+          <mc:Fallback xmlns="">
             <p:sp>
               <p:nvSpPr>
                 <p:cNvPr id="9" name="文字方塊 8"/>
@@ -7745,8 +8734,8 @@
             </p:sp>
           </mc:Fallback>
         </mc:AlternateContent>
-        <mc:AlternateContent xmlns:mc="http://schemas.openxmlformats.org/markup-compatibility/2006">
-          <mc:Choice xmlns:a14="http://schemas.microsoft.com/office/drawing/2010/main" Requires="a14">
+        <mc:AlternateContent xmlns:mc="http://schemas.openxmlformats.org/markup-compatibility/2006" xmlns:a14="http://schemas.microsoft.com/office/drawing/2010/main">
+          <mc:Choice Requires="a14">
             <p:sp>
               <p:nvSpPr>
                 <p:cNvPr id="17" name="文字方塊 16"/>
@@ -7769,9 +8758,8 @@
                 </a:bodyPr>
                 <a:lstStyle/>
                 <a:p>
-                  <a:pPr/>
                   <a:r>
-                    <a:rPr lang="en-US" altLang="zh-TW" b="0" dirty="0" smtClean="0"/>
+                    <a:rPr lang="en-US" altLang="zh-TW" b="0" dirty="0"/>
                     <a:t>b</a:t>
                   </a:r>
                   <a14:m>
@@ -7961,7 +8949,7 @@
               </p:txBody>
             </p:sp>
           </mc:Choice>
-          <mc:Fallback>
+          <mc:Fallback xmlns="">
             <p:sp>
               <p:nvSpPr>
                 <p:cNvPr id="17" name="文字方塊 16"/>
@@ -8033,15 +9021,19 @@
       </p:grpSpPr>
       <p:pic>
         <p:nvPicPr>
-          <p:cNvPr id="4" name="內容版面配置區 3"/>
+          <p:cNvPr id="3" name="Picture 2">
+            <a:extLst>
+              <a:ext uri="{FF2B5EF4-FFF2-40B4-BE49-F238E27FC236}">
+                <a16:creationId xmlns:a16="http://schemas.microsoft.com/office/drawing/2014/main" id="{27C5D848-E4A6-4942-B484-DAC0706DAFD5}"/>
+              </a:ext>
+            </a:extLst>
+          </p:cNvPr>
           <p:cNvPicPr>
-            <a:picLocks noGrp="1" noChangeAspect="1"/>
+            <a:picLocks noChangeAspect="1"/>
           </p:cNvPicPr>
-          <p:nvPr>
-            <p:ph idx="1"/>
-          </p:nvPr>
+          <p:nvPr/>
         </p:nvPicPr>
-        <p:blipFill>
+        <p:blipFill rotWithShape="1">
           <a:blip r:embed="rId2">
             <a:extLst>
               <a:ext uri="{28A0092B-C50C-407E-A947-70E740481C1C}">
@@ -8049,15 +9041,17 @@
               </a:ext>
             </a:extLst>
           </a:blip>
-          <a:stretch>
-            <a:fillRect/>
-          </a:stretch>
+          <a:srcRect l="9248" t="14074" r="9248" b="10617"/>
+          <a:stretch/>
         </p:blipFill>
         <p:spPr>
           <a:xfrm>
-            <a:off x="2440646" y="115328"/>
-            <a:ext cx="7120850" cy="6573795"/>
+            <a:off x="2835640" y="0"/>
+            <a:ext cx="6520720" cy="6858000"/>
           </a:xfrm>
+          <a:prstGeom prst="rect">
+            <a:avLst/>
+          </a:prstGeom>
         </p:spPr>
       </p:pic>
     </p:spTree>

</xml_diff>